<commit_message>
Finished presentation for week 1
</commit_message>
<xml_diff>
--- a/20170911_scikit_cnn_lstm.pptx
+++ b/20170911_scikit_cnn_lstm.pptx
@@ -4,14 +4,21 @@
   <p:sldMasterIdLst>
     <p:sldMasterId id="2147483648" r:id="rId1"/>
   </p:sldMasterIdLst>
+  <p:notesMasterIdLst>
+    <p:notesMasterId r:id="rId13"/>
+  </p:notesMasterIdLst>
   <p:sldIdLst>
     <p:sldId id="256" r:id="rId2"/>
     <p:sldId id="257" r:id="rId3"/>
-    <p:sldId id="258" r:id="rId4"/>
-    <p:sldId id="261" r:id="rId5"/>
+    <p:sldId id="265" r:id="rId4"/>
+    <p:sldId id="269" r:id="rId5"/>
     <p:sldId id="259" r:id="rId6"/>
-    <p:sldId id="262" r:id="rId7"/>
-    <p:sldId id="263" r:id="rId8"/>
+    <p:sldId id="270" r:id="rId7"/>
+    <p:sldId id="271" r:id="rId8"/>
+    <p:sldId id="267" r:id="rId9"/>
+    <p:sldId id="262" r:id="rId10"/>
+    <p:sldId id="272" r:id="rId11"/>
+    <p:sldId id="263" r:id="rId12"/>
   </p:sldIdLst>
   <p:sldSz cx="12192000" cy="6858000"/>
   <p:notesSz cx="6858000" cy="9144000"/>
@@ -110,7 +117,2662 @@
       </a:defRPr>
     </a:lvl9pPr>
   </p:defaultTextStyle>
+  <p:extLst>
+    <p:ext uri="{EFAFB233-063F-42B5-8137-9DF3F51BA10A}">
+      <p15:sldGuideLst xmlns:p15="http://schemas.microsoft.com/office/powerpoint/2012/main"/>
+    </p:ext>
+  </p:extLst>
 </p:presentation>
+</file>
+
+<file path=ppt/revisionInfo.xml><?xml version="1.0" encoding="utf-8"?>
+<p1510:revInfo xmlns:a="http://schemas.openxmlformats.org/drawingml/2006/main" xmlns:r="http://schemas.openxmlformats.org/officeDocument/2006/relationships" xmlns:p1510="http://schemas.microsoft.com/office/powerpoint/2015/10/main"/>
+</file>
+
+<file path=ppt/notesMasters/notesMaster1.xml><?xml version="1.0" encoding="utf-8"?>
+<p:notesMaster xmlns:a="http://schemas.openxmlformats.org/drawingml/2006/main" xmlns:r="http://schemas.openxmlformats.org/officeDocument/2006/relationships" xmlns:p="http://schemas.openxmlformats.org/presentationml/2006/main">
+  <p:cSld>
+    <p:bg>
+      <p:bgRef idx="1001">
+        <a:schemeClr val="bg1"/>
+      </p:bgRef>
+    </p:bg>
+    <p:spTree>
+      <p:nvGrpSpPr>
+        <p:cNvPr id="1" name=""/>
+        <p:cNvGrpSpPr/>
+        <p:nvPr/>
+      </p:nvGrpSpPr>
+      <p:grpSpPr>
+        <a:xfrm>
+          <a:off x="0" y="0"/>
+          <a:ext cx="0" cy="0"/>
+          <a:chOff x="0" y="0"/>
+          <a:chExt cx="0" cy="0"/>
+        </a:xfrm>
+      </p:grpSpPr>
+      <p:sp>
+        <p:nvSpPr>
+          <p:cNvPr id="2" name="Header Placeholder 1"/>
+          <p:cNvSpPr>
+            <a:spLocks noGrp="1"/>
+          </p:cNvSpPr>
+          <p:nvPr>
+            <p:ph type="hdr" sz="quarter"/>
+          </p:nvPr>
+        </p:nvSpPr>
+        <p:spPr>
+          <a:xfrm>
+            <a:off x="0" y="0"/>
+            <a:ext cx="2971800" cy="458788"/>
+          </a:xfrm>
+          <a:prstGeom prst="rect">
+            <a:avLst/>
+          </a:prstGeom>
+        </p:spPr>
+        <p:txBody>
+          <a:bodyPr vert="horz" lIns="91440" tIns="45720" rIns="91440" bIns="45720" rtlCol="0"/>
+          <a:lstStyle>
+            <a:lvl1pPr algn="l">
+              <a:defRPr sz="1200"/>
+            </a:lvl1pPr>
+          </a:lstStyle>
+          <a:p>
+            <a:endParaRPr lang="en-US"/>
+          </a:p>
+        </p:txBody>
+      </p:sp>
+      <p:sp>
+        <p:nvSpPr>
+          <p:cNvPr id="3" name="Date Placeholder 2"/>
+          <p:cNvSpPr>
+            <a:spLocks noGrp="1"/>
+          </p:cNvSpPr>
+          <p:nvPr>
+            <p:ph type="dt" idx="1"/>
+          </p:nvPr>
+        </p:nvSpPr>
+        <p:spPr>
+          <a:xfrm>
+            <a:off x="3884613" y="0"/>
+            <a:ext cx="2971800" cy="458788"/>
+          </a:xfrm>
+          <a:prstGeom prst="rect">
+            <a:avLst/>
+          </a:prstGeom>
+        </p:spPr>
+        <p:txBody>
+          <a:bodyPr vert="horz" lIns="91440" tIns="45720" rIns="91440" bIns="45720" rtlCol="0"/>
+          <a:lstStyle>
+            <a:lvl1pPr algn="r">
+              <a:defRPr sz="1200"/>
+            </a:lvl1pPr>
+          </a:lstStyle>
+          <a:p>
+            <a:fld id="{F9B18501-095D-4A1D-A876-93B575838968}" type="datetimeFigureOut">
+              <a:rPr lang="en-US" smtClean="0"/>
+              <a:t>11-Sep-17</a:t>
+            </a:fld>
+            <a:endParaRPr lang="en-US"/>
+          </a:p>
+        </p:txBody>
+      </p:sp>
+      <p:sp>
+        <p:nvSpPr>
+          <p:cNvPr id="4" name="Slide Image Placeholder 3"/>
+          <p:cNvSpPr>
+            <a:spLocks noGrp="1" noRot="1" noChangeAspect="1"/>
+          </p:cNvSpPr>
+          <p:nvPr>
+            <p:ph type="sldImg" idx="2"/>
+          </p:nvPr>
+        </p:nvSpPr>
+        <p:spPr>
+          <a:xfrm>
+            <a:off x="685800" y="1143000"/>
+            <a:ext cx="5486400" cy="3086100"/>
+          </a:xfrm>
+          <a:prstGeom prst="rect">
+            <a:avLst/>
+          </a:prstGeom>
+          <a:noFill/>
+          <a:ln w="12700">
+            <a:solidFill>
+              <a:prstClr val="black"/>
+            </a:solidFill>
+          </a:ln>
+        </p:spPr>
+        <p:txBody>
+          <a:bodyPr vert="horz" lIns="91440" tIns="45720" rIns="91440" bIns="45720" rtlCol="0" anchor="ctr"/>
+          <a:lstStyle/>
+          <a:p>
+            <a:endParaRPr lang="en-US"/>
+          </a:p>
+        </p:txBody>
+      </p:sp>
+      <p:sp>
+        <p:nvSpPr>
+          <p:cNvPr id="5" name="Notes Placeholder 4"/>
+          <p:cNvSpPr>
+            <a:spLocks noGrp="1"/>
+          </p:cNvSpPr>
+          <p:nvPr>
+            <p:ph type="body" sz="quarter" idx="3"/>
+          </p:nvPr>
+        </p:nvSpPr>
+        <p:spPr>
+          <a:xfrm>
+            <a:off x="685800" y="4400550"/>
+            <a:ext cx="5486400" cy="3600450"/>
+          </a:xfrm>
+          <a:prstGeom prst="rect">
+            <a:avLst/>
+          </a:prstGeom>
+        </p:spPr>
+        <p:txBody>
+          <a:bodyPr vert="horz" lIns="91440" tIns="45720" rIns="91440" bIns="45720" rtlCol="0"/>
+          <a:lstStyle/>
+          <a:p>
+            <a:pPr lvl="0"/>
+            <a:r>
+              <a:rPr lang="en-US"/>
+              <a:t>Edit Master text styles</a:t>
+            </a:r>
+          </a:p>
+          <a:p>
+            <a:pPr lvl="1"/>
+            <a:r>
+              <a:rPr lang="en-US"/>
+              <a:t>Second level</a:t>
+            </a:r>
+          </a:p>
+          <a:p>
+            <a:pPr lvl="2"/>
+            <a:r>
+              <a:rPr lang="en-US"/>
+              <a:t>Third level</a:t>
+            </a:r>
+          </a:p>
+          <a:p>
+            <a:pPr lvl="3"/>
+            <a:r>
+              <a:rPr lang="en-US"/>
+              <a:t>Fourth level</a:t>
+            </a:r>
+          </a:p>
+          <a:p>
+            <a:pPr lvl="4"/>
+            <a:r>
+              <a:rPr lang="en-US"/>
+              <a:t>Fifth level</a:t>
+            </a:r>
+          </a:p>
+        </p:txBody>
+      </p:sp>
+      <p:sp>
+        <p:nvSpPr>
+          <p:cNvPr id="6" name="Footer Placeholder 5"/>
+          <p:cNvSpPr>
+            <a:spLocks noGrp="1"/>
+          </p:cNvSpPr>
+          <p:nvPr>
+            <p:ph type="ftr" sz="quarter" idx="4"/>
+          </p:nvPr>
+        </p:nvSpPr>
+        <p:spPr>
+          <a:xfrm>
+            <a:off x="0" y="8685213"/>
+            <a:ext cx="2971800" cy="458787"/>
+          </a:xfrm>
+          <a:prstGeom prst="rect">
+            <a:avLst/>
+          </a:prstGeom>
+        </p:spPr>
+        <p:txBody>
+          <a:bodyPr vert="horz" lIns="91440" tIns="45720" rIns="91440" bIns="45720" rtlCol="0" anchor="b"/>
+          <a:lstStyle>
+            <a:lvl1pPr algn="l">
+              <a:defRPr sz="1200"/>
+            </a:lvl1pPr>
+          </a:lstStyle>
+          <a:p>
+            <a:endParaRPr lang="en-US"/>
+          </a:p>
+        </p:txBody>
+      </p:sp>
+      <p:sp>
+        <p:nvSpPr>
+          <p:cNvPr id="7" name="Slide Number Placeholder 6"/>
+          <p:cNvSpPr>
+            <a:spLocks noGrp="1"/>
+          </p:cNvSpPr>
+          <p:nvPr>
+            <p:ph type="sldNum" sz="quarter" idx="5"/>
+          </p:nvPr>
+        </p:nvSpPr>
+        <p:spPr>
+          <a:xfrm>
+            <a:off x="3884613" y="8685213"/>
+            <a:ext cx="2971800" cy="458787"/>
+          </a:xfrm>
+          <a:prstGeom prst="rect">
+            <a:avLst/>
+          </a:prstGeom>
+        </p:spPr>
+        <p:txBody>
+          <a:bodyPr vert="horz" lIns="91440" tIns="45720" rIns="91440" bIns="45720" rtlCol="0" anchor="b"/>
+          <a:lstStyle>
+            <a:lvl1pPr algn="r">
+              <a:defRPr sz="1200"/>
+            </a:lvl1pPr>
+          </a:lstStyle>
+          <a:p>
+            <a:fld id="{E6E59516-A3BF-4735-8DA9-18A21994B58E}" type="slidenum">
+              <a:rPr lang="en-US" smtClean="0"/>
+              <a:t>‹#›</a:t>
+            </a:fld>
+            <a:endParaRPr lang="en-US"/>
+          </a:p>
+        </p:txBody>
+      </p:sp>
+    </p:spTree>
+    <p:extLst>
+      <p:ext uri="{BB962C8B-B14F-4D97-AF65-F5344CB8AC3E}">
+        <p14:creationId xmlns:p14="http://schemas.microsoft.com/office/powerpoint/2010/main" val="4078419316"/>
+      </p:ext>
+    </p:extLst>
+  </p:cSld>
+  <p:clrMap bg1="lt1" tx1="dk1" bg2="lt2" tx2="dk2" accent1="accent1" accent2="accent2" accent3="accent3" accent4="accent4" accent5="accent5" accent6="accent6" hlink="hlink" folHlink="folHlink"/>
+  <p:notesStyle>
+    <a:lvl1pPr marL="0" algn="l" defTabSz="914400" rtl="0" eaLnBrk="1" latinLnBrk="0" hangingPunct="1">
+      <a:defRPr sz="1200" kern="1200">
+        <a:solidFill>
+          <a:schemeClr val="tx1"/>
+        </a:solidFill>
+        <a:latin typeface="+mn-lt"/>
+        <a:ea typeface="+mn-ea"/>
+        <a:cs typeface="+mn-cs"/>
+      </a:defRPr>
+    </a:lvl1pPr>
+    <a:lvl2pPr marL="457200" algn="l" defTabSz="914400" rtl="0" eaLnBrk="1" latinLnBrk="0" hangingPunct="1">
+      <a:defRPr sz="1200" kern="1200">
+        <a:solidFill>
+          <a:schemeClr val="tx1"/>
+        </a:solidFill>
+        <a:latin typeface="+mn-lt"/>
+        <a:ea typeface="+mn-ea"/>
+        <a:cs typeface="+mn-cs"/>
+      </a:defRPr>
+    </a:lvl2pPr>
+    <a:lvl3pPr marL="914400" algn="l" defTabSz="914400" rtl="0" eaLnBrk="1" latinLnBrk="0" hangingPunct="1">
+      <a:defRPr sz="1200" kern="1200">
+        <a:solidFill>
+          <a:schemeClr val="tx1"/>
+        </a:solidFill>
+        <a:latin typeface="+mn-lt"/>
+        <a:ea typeface="+mn-ea"/>
+        <a:cs typeface="+mn-cs"/>
+      </a:defRPr>
+    </a:lvl3pPr>
+    <a:lvl4pPr marL="1371600" algn="l" defTabSz="914400" rtl="0" eaLnBrk="1" latinLnBrk="0" hangingPunct="1">
+      <a:defRPr sz="1200" kern="1200">
+        <a:solidFill>
+          <a:schemeClr val="tx1"/>
+        </a:solidFill>
+        <a:latin typeface="+mn-lt"/>
+        <a:ea typeface="+mn-ea"/>
+        <a:cs typeface="+mn-cs"/>
+      </a:defRPr>
+    </a:lvl4pPr>
+    <a:lvl5pPr marL="1828800" algn="l" defTabSz="914400" rtl="0" eaLnBrk="1" latinLnBrk="0" hangingPunct="1">
+      <a:defRPr sz="1200" kern="1200">
+        <a:solidFill>
+          <a:schemeClr val="tx1"/>
+        </a:solidFill>
+        <a:latin typeface="+mn-lt"/>
+        <a:ea typeface="+mn-ea"/>
+        <a:cs typeface="+mn-cs"/>
+      </a:defRPr>
+    </a:lvl5pPr>
+    <a:lvl6pPr marL="2286000" algn="l" defTabSz="914400" rtl="0" eaLnBrk="1" latinLnBrk="0" hangingPunct="1">
+      <a:defRPr sz="1200" kern="1200">
+        <a:solidFill>
+          <a:schemeClr val="tx1"/>
+        </a:solidFill>
+        <a:latin typeface="+mn-lt"/>
+        <a:ea typeface="+mn-ea"/>
+        <a:cs typeface="+mn-cs"/>
+      </a:defRPr>
+    </a:lvl6pPr>
+    <a:lvl7pPr marL="2743200" algn="l" defTabSz="914400" rtl="0" eaLnBrk="1" latinLnBrk="0" hangingPunct="1">
+      <a:defRPr sz="1200" kern="1200">
+        <a:solidFill>
+          <a:schemeClr val="tx1"/>
+        </a:solidFill>
+        <a:latin typeface="+mn-lt"/>
+        <a:ea typeface="+mn-ea"/>
+        <a:cs typeface="+mn-cs"/>
+      </a:defRPr>
+    </a:lvl7pPr>
+    <a:lvl8pPr marL="3200400" algn="l" defTabSz="914400" rtl="0" eaLnBrk="1" latinLnBrk="0" hangingPunct="1">
+      <a:defRPr sz="1200" kern="1200">
+        <a:solidFill>
+          <a:schemeClr val="tx1"/>
+        </a:solidFill>
+        <a:latin typeface="+mn-lt"/>
+        <a:ea typeface="+mn-ea"/>
+        <a:cs typeface="+mn-cs"/>
+      </a:defRPr>
+    </a:lvl8pPr>
+    <a:lvl9pPr marL="3657600" algn="l" defTabSz="914400" rtl="0" eaLnBrk="1" latinLnBrk="0" hangingPunct="1">
+      <a:defRPr sz="1200" kern="1200">
+        <a:solidFill>
+          <a:schemeClr val="tx1"/>
+        </a:solidFill>
+        <a:latin typeface="+mn-lt"/>
+        <a:ea typeface="+mn-ea"/>
+        <a:cs typeface="+mn-cs"/>
+      </a:defRPr>
+    </a:lvl9pPr>
+  </p:notesStyle>
+</p:notesMaster>
+</file>
+
+<file path=ppt/notesSlides/notesSlide1.xml><?xml version="1.0" encoding="utf-8"?>
+<p:notes xmlns:a="http://schemas.openxmlformats.org/drawingml/2006/main" xmlns:r="http://schemas.openxmlformats.org/officeDocument/2006/relationships" xmlns:p="http://schemas.openxmlformats.org/presentationml/2006/main">
+  <p:cSld>
+    <p:spTree>
+      <p:nvGrpSpPr>
+        <p:cNvPr id="1" name=""/>
+        <p:cNvGrpSpPr/>
+        <p:nvPr/>
+      </p:nvGrpSpPr>
+      <p:grpSpPr>
+        <a:xfrm>
+          <a:off x="0" y="0"/>
+          <a:ext cx="0" cy="0"/>
+          <a:chOff x="0" y="0"/>
+          <a:chExt cx="0" cy="0"/>
+        </a:xfrm>
+      </p:grpSpPr>
+      <p:sp>
+        <p:nvSpPr>
+          <p:cNvPr id="2" name="Slide Image Placeholder 1"/>
+          <p:cNvSpPr>
+            <a:spLocks noGrp="1" noRot="1" noChangeAspect="1"/>
+          </p:cNvSpPr>
+          <p:nvPr>
+            <p:ph type="sldImg"/>
+          </p:nvPr>
+        </p:nvSpPr>
+        <p:spPr/>
+      </p:sp>
+      <p:sp>
+        <p:nvSpPr>
+          <p:cNvPr id="3" name="Notes Placeholder 2"/>
+          <p:cNvSpPr>
+            <a:spLocks noGrp="1"/>
+          </p:cNvSpPr>
+          <p:nvPr>
+            <p:ph type="body" idx="1"/>
+          </p:nvPr>
+        </p:nvSpPr>
+        <p:spPr/>
+        <p:txBody>
+          <a:bodyPr/>
+          <a:lstStyle/>
+          <a:p>
+            <a:r>
+              <a:rPr lang="th-TH" dirty="0"/>
+              <a:t>ได้ไปเรียนรู้พวก </a:t>
+            </a:r>
+            <a:r>
+              <a:rPr lang="en-US" dirty="0"/>
+              <a:t>library </a:t>
+            </a:r>
+            <a:r>
+              <a:rPr lang="th-TH" dirty="0"/>
+              <a:t>ต่างๆ ของ </a:t>
+            </a:r>
+            <a:r>
+              <a:rPr lang="en-US" dirty="0"/>
+              <a:t>python</a:t>
+            </a:r>
+            <a:r>
+              <a:rPr lang="th-TH" dirty="0"/>
+              <a:t> เช่น</a:t>
+            </a:r>
+            <a:endParaRPr lang="en-US" dirty="0"/>
+          </a:p>
+          <a:p>
+            <a:pPr marL="171450" indent="-171450">
+              <a:buFont typeface="Arial" panose="020B0604020202020204" pitchFamily="34" charset="0"/>
+              <a:buChar char="•"/>
+            </a:pPr>
+            <a:r>
+              <a:rPr lang="en-US" dirty="0" err="1"/>
+              <a:t>Numpy</a:t>
+            </a:r>
+            <a:r>
+              <a:rPr lang="en-US" dirty="0"/>
+              <a:t> </a:t>
+            </a:r>
+            <a:r>
+              <a:rPr lang="th-TH" dirty="0"/>
+              <a:t>คือพวกการจัดการ </a:t>
+            </a:r>
+            <a:r>
+              <a:rPr lang="en-US" dirty="0"/>
+              <a:t>array</a:t>
+            </a:r>
+            <a:endParaRPr lang="th-TH" dirty="0"/>
+          </a:p>
+          <a:p>
+            <a:pPr marL="171450" indent="-171450">
+              <a:buFont typeface="Arial" panose="020B0604020202020204" pitchFamily="34" charset="0"/>
+              <a:buChar char="•"/>
+            </a:pPr>
+            <a:r>
+              <a:rPr lang="en-US" dirty="0"/>
+              <a:t>Pandas </a:t>
+            </a:r>
+            <a:r>
+              <a:rPr lang="th-TH" dirty="0"/>
+              <a:t>คือพวกการจัดการข้อมูล เช่น </a:t>
+            </a:r>
+            <a:endParaRPr lang="en-US" dirty="0"/>
+          </a:p>
+          <a:p>
+            <a:pPr marL="628650" lvl="1" indent="-171450">
+              <a:buFont typeface="Courier New" panose="02070309020205020404" pitchFamily="49" charset="0"/>
+              <a:buChar char="o"/>
+            </a:pPr>
+            <a:r>
+              <a:rPr lang="th-TH" dirty="0"/>
+              <a:t>เอามาใส่ใน </a:t>
+            </a:r>
+            <a:r>
+              <a:rPr lang="en-US" dirty="0" err="1"/>
+              <a:t>DataFrames</a:t>
+            </a:r>
+            <a:endParaRPr lang="en-US" dirty="0"/>
+          </a:p>
+          <a:p>
+            <a:pPr marL="628650" lvl="1" indent="-171450">
+              <a:buFont typeface="Courier New" panose="02070309020205020404" pitchFamily="49" charset="0"/>
+              <a:buChar char="o"/>
+            </a:pPr>
+            <a:r>
+              <a:rPr lang="en-US" dirty="0"/>
+              <a:t>Missing Data</a:t>
+            </a:r>
+          </a:p>
+          <a:p>
+            <a:pPr marL="171450" indent="-171450">
+              <a:buFont typeface="Arial" panose="020B0604020202020204" pitchFamily="34" charset="0"/>
+              <a:buChar char="•"/>
+            </a:pPr>
+            <a:r>
+              <a:rPr lang="en-US" dirty="0" err="1"/>
+              <a:t>Scikit</a:t>
+            </a:r>
+            <a:r>
+              <a:rPr lang="en-US" dirty="0"/>
+              <a:t>-Learn </a:t>
+            </a:r>
+            <a:r>
+              <a:rPr lang="th-TH" dirty="0"/>
+              <a:t>มีทดลองทำ</a:t>
+            </a:r>
+            <a:r>
+              <a:rPr lang="en-US" dirty="0"/>
+              <a:t> </a:t>
+            </a:r>
+            <a:r>
+              <a:rPr lang="th-TH" dirty="0"/>
+              <a:t>เช่น</a:t>
+            </a:r>
+          </a:p>
+          <a:p>
+            <a:pPr marL="628650" lvl="1" indent="-171450">
+              <a:buFont typeface="Arial" panose="020B0604020202020204" pitchFamily="34" charset="0"/>
+              <a:buChar char="•"/>
+            </a:pPr>
+            <a:r>
+              <a:rPr lang="th-TH" dirty="0"/>
+              <a:t>ทำ </a:t>
+            </a:r>
+            <a:r>
+              <a:rPr lang="en-US" dirty="0"/>
+              <a:t>regression</a:t>
+            </a:r>
+            <a:r>
+              <a:rPr lang="en-US" baseline="0" dirty="0"/>
+              <a:t> </a:t>
+            </a:r>
+            <a:r>
+              <a:rPr lang="th-TH" baseline="0" dirty="0"/>
+              <a:t>เช่น </a:t>
+            </a:r>
+            <a:r>
+              <a:rPr lang="en-US" baseline="0" dirty="0"/>
+              <a:t>Simple Linear Regression</a:t>
+            </a:r>
+            <a:endParaRPr lang="th-TH" baseline="0" dirty="0"/>
+          </a:p>
+          <a:p>
+            <a:pPr marL="628650" lvl="1" indent="-171450">
+              <a:buFont typeface="Arial" panose="020B0604020202020204" pitchFamily="34" charset="0"/>
+              <a:buChar char="•"/>
+            </a:pPr>
+            <a:r>
+              <a:rPr lang="th-TH" baseline="0" dirty="0"/>
+              <a:t>ดูตัวอย่างการทำ </a:t>
+            </a:r>
+            <a:r>
+              <a:rPr lang="en-US" baseline="0" dirty="0"/>
+              <a:t>classification</a:t>
+            </a:r>
+            <a:endParaRPr lang="en-US" dirty="0"/>
+          </a:p>
+        </p:txBody>
+      </p:sp>
+      <p:sp>
+        <p:nvSpPr>
+          <p:cNvPr id="4" name="Slide Number Placeholder 3"/>
+          <p:cNvSpPr>
+            <a:spLocks noGrp="1"/>
+          </p:cNvSpPr>
+          <p:nvPr>
+            <p:ph type="sldNum" sz="quarter" idx="10"/>
+          </p:nvPr>
+        </p:nvSpPr>
+        <p:spPr/>
+        <p:txBody>
+          <a:bodyPr/>
+          <a:lstStyle/>
+          <a:p>
+            <a:fld id="{E6E59516-A3BF-4735-8DA9-18A21994B58E}" type="slidenum">
+              <a:rPr lang="en-US" smtClean="0"/>
+              <a:t>2</a:t>
+            </a:fld>
+            <a:endParaRPr lang="en-US"/>
+          </a:p>
+        </p:txBody>
+      </p:sp>
+    </p:spTree>
+    <p:extLst>
+      <p:ext uri="{BB962C8B-B14F-4D97-AF65-F5344CB8AC3E}">
+        <p14:creationId xmlns:p14="http://schemas.microsoft.com/office/powerpoint/2010/main" val="161124919"/>
+      </p:ext>
+    </p:extLst>
+  </p:cSld>
+  <p:clrMapOvr>
+    <a:masterClrMapping/>
+  </p:clrMapOvr>
+</p:notes>
+</file>
+
+<file path=ppt/notesSlides/notesSlide2.xml><?xml version="1.0" encoding="utf-8"?>
+<p:notes xmlns:a="http://schemas.openxmlformats.org/drawingml/2006/main" xmlns:r="http://schemas.openxmlformats.org/officeDocument/2006/relationships" xmlns:p="http://schemas.openxmlformats.org/presentationml/2006/main">
+  <p:cSld>
+    <p:spTree>
+      <p:nvGrpSpPr>
+        <p:cNvPr id="1" name=""/>
+        <p:cNvGrpSpPr/>
+        <p:nvPr/>
+      </p:nvGrpSpPr>
+      <p:grpSpPr>
+        <a:xfrm>
+          <a:off x="0" y="0"/>
+          <a:ext cx="0" cy="0"/>
+          <a:chOff x="0" y="0"/>
+          <a:chExt cx="0" cy="0"/>
+        </a:xfrm>
+      </p:grpSpPr>
+      <p:sp>
+        <p:nvSpPr>
+          <p:cNvPr id="2" name="Slide Image Placeholder 1"/>
+          <p:cNvSpPr>
+            <a:spLocks noGrp="1" noRot="1" noChangeAspect="1"/>
+          </p:cNvSpPr>
+          <p:nvPr>
+            <p:ph type="sldImg"/>
+          </p:nvPr>
+        </p:nvSpPr>
+        <p:spPr/>
+      </p:sp>
+      <p:sp>
+        <p:nvSpPr>
+          <p:cNvPr id="3" name="Notes Placeholder 2"/>
+          <p:cNvSpPr>
+            <a:spLocks noGrp="1"/>
+          </p:cNvSpPr>
+          <p:nvPr>
+            <p:ph type="body" idx="1"/>
+          </p:nvPr>
+        </p:nvSpPr>
+        <p:spPr/>
+        <p:txBody>
+          <a:bodyPr/>
+          <a:lstStyle/>
+          <a:p>
+            <a:r>
+              <a:rPr lang="en-US" dirty="0"/>
+              <a:t>Random state = 0 </a:t>
+            </a:r>
+            <a:r>
+              <a:rPr lang="th-TH" dirty="0"/>
+              <a:t>คือทุกรอบแบ่งข้อมูลเหมือนกัน</a:t>
+            </a:r>
+            <a:endParaRPr lang="en-US" dirty="0"/>
+          </a:p>
+        </p:txBody>
+      </p:sp>
+      <p:sp>
+        <p:nvSpPr>
+          <p:cNvPr id="4" name="Slide Number Placeholder 3"/>
+          <p:cNvSpPr>
+            <a:spLocks noGrp="1"/>
+          </p:cNvSpPr>
+          <p:nvPr>
+            <p:ph type="sldNum" sz="quarter" idx="10"/>
+          </p:nvPr>
+        </p:nvSpPr>
+        <p:spPr/>
+        <p:txBody>
+          <a:bodyPr/>
+          <a:lstStyle/>
+          <a:p>
+            <a:fld id="{E6E59516-A3BF-4735-8DA9-18A21994B58E}" type="slidenum">
+              <a:rPr lang="en-US" smtClean="0"/>
+              <a:t>3</a:t>
+            </a:fld>
+            <a:endParaRPr lang="en-US"/>
+          </a:p>
+        </p:txBody>
+      </p:sp>
+    </p:spTree>
+    <p:extLst>
+      <p:ext uri="{BB962C8B-B14F-4D97-AF65-F5344CB8AC3E}">
+        <p14:creationId xmlns:p14="http://schemas.microsoft.com/office/powerpoint/2010/main" val="1286906809"/>
+      </p:ext>
+    </p:extLst>
+  </p:cSld>
+  <p:clrMapOvr>
+    <a:masterClrMapping/>
+  </p:clrMapOvr>
+</p:notes>
+</file>
+
+<file path=ppt/notesSlides/notesSlide3.xml><?xml version="1.0" encoding="utf-8"?>
+<p:notes xmlns:a="http://schemas.openxmlformats.org/drawingml/2006/main" xmlns:r="http://schemas.openxmlformats.org/officeDocument/2006/relationships" xmlns:p="http://schemas.openxmlformats.org/presentationml/2006/main">
+  <p:cSld>
+    <p:spTree>
+      <p:nvGrpSpPr>
+        <p:cNvPr id="1" name=""/>
+        <p:cNvGrpSpPr/>
+        <p:nvPr/>
+      </p:nvGrpSpPr>
+      <p:grpSpPr>
+        <a:xfrm>
+          <a:off x="0" y="0"/>
+          <a:ext cx="0" cy="0"/>
+          <a:chOff x="0" y="0"/>
+          <a:chExt cx="0" cy="0"/>
+        </a:xfrm>
+      </p:grpSpPr>
+      <p:sp>
+        <p:nvSpPr>
+          <p:cNvPr id="2" name="Slide Image Placeholder 1"/>
+          <p:cNvSpPr>
+            <a:spLocks noGrp="1" noRot="1" noChangeAspect="1"/>
+          </p:cNvSpPr>
+          <p:nvPr>
+            <p:ph type="sldImg"/>
+          </p:nvPr>
+        </p:nvSpPr>
+        <p:spPr/>
+      </p:sp>
+      <p:sp>
+        <p:nvSpPr>
+          <p:cNvPr id="3" name="Notes Placeholder 2"/>
+          <p:cNvSpPr>
+            <a:spLocks noGrp="1"/>
+          </p:cNvSpPr>
+          <p:nvPr>
+            <p:ph type="body" idx="1"/>
+          </p:nvPr>
+        </p:nvSpPr>
+        <p:spPr/>
+        <p:txBody>
+          <a:bodyPr/>
+          <a:lstStyle/>
+          <a:p>
+            <a:r>
+              <a:rPr lang="en-US" dirty="0"/>
+              <a:t>Feedforward Networks</a:t>
+            </a:r>
+          </a:p>
+          <a:p>
+            <a:pPr marL="171450" indent="-171450">
+              <a:buFontTx/>
+              <a:buChar char="-"/>
+            </a:pPr>
+            <a:r>
+              <a:rPr lang="th-TH" baseline="0" dirty="0"/>
+              <a:t>เป็น </a:t>
+            </a:r>
+            <a:r>
+              <a:rPr lang="en-US" baseline="0" dirty="0"/>
+              <a:t>Supervised Learning </a:t>
+            </a:r>
+            <a:r>
+              <a:rPr lang="th-TH" baseline="0" dirty="0"/>
+              <a:t>ซึ่งมันคือการที่ </a:t>
+            </a:r>
+            <a:r>
+              <a:rPr lang="en-US" baseline="0" dirty="0"/>
+              <a:t>data </a:t>
+            </a:r>
+            <a:r>
+              <a:rPr lang="th-TH" baseline="0" dirty="0"/>
+              <a:t>ที่เรานำมา </a:t>
+            </a:r>
+            <a:r>
+              <a:rPr lang="en-US" baseline="0" dirty="0"/>
+              <a:t>train &amp;</a:t>
+            </a:r>
+            <a:r>
+              <a:rPr lang="th-TH" baseline="0" dirty="0"/>
+              <a:t> </a:t>
+            </a:r>
+            <a:r>
+              <a:rPr lang="en-US" baseline="0" dirty="0"/>
+              <a:t>test </a:t>
+            </a:r>
+            <a:r>
+              <a:rPr lang="th-TH" baseline="0" dirty="0"/>
+              <a:t>จะมี </a:t>
+            </a:r>
+            <a:r>
+              <a:rPr lang="en-US" baseline="0" dirty="0"/>
+              <a:t>label </a:t>
+            </a:r>
+            <a:r>
+              <a:rPr lang="th-TH" baseline="0" dirty="0"/>
+              <a:t>บอกกำกับอยู่ว่าเป็น</a:t>
+            </a:r>
+            <a:r>
+              <a:rPr lang="en-US" baseline="0" dirty="0"/>
+              <a:t> category </a:t>
+            </a:r>
+            <a:r>
+              <a:rPr lang="th-TH" baseline="0" dirty="0"/>
+              <a:t>อะไร</a:t>
+            </a:r>
+            <a:endParaRPr lang="en-US" baseline="0" dirty="0"/>
+          </a:p>
+          <a:p>
+            <a:pPr marL="0" indent="0">
+              <a:buFontTx/>
+              <a:buNone/>
+            </a:pPr>
+            <a:endParaRPr lang="en-US" dirty="0"/>
+          </a:p>
+          <a:p>
+            <a:pPr marL="0" indent="0">
+              <a:buFontTx/>
+              <a:buNone/>
+            </a:pPr>
+            <a:r>
+              <a:rPr lang="en-US" dirty="0"/>
+              <a:t>Neuron</a:t>
+            </a:r>
+          </a:p>
+          <a:p>
+            <a:pPr marL="171450" indent="-171450">
+              <a:buFontTx/>
+              <a:buChar char="-"/>
+            </a:pPr>
+            <a:r>
+              <a:rPr lang="th-TH" dirty="0"/>
+              <a:t>ใน </a:t>
+            </a:r>
+            <a:r>
+              <a:rPr lang="en-US" dirty="0"/>
+              <a:t>neuron node </a:t>
+            </a:r>
+            <a:r>
+              <a:rPr lang="th-TH" dirty="0"/>
+              <a:t>เช่น </a:t>
+            </a:r>
+            <a:r>
+              <a:rPr lang="en-US" dirty="0"/>
+              <a:t>hidden layer </a:t>
+            </a:r>
+            <a:r>
+              <a:rPr lang="th-TH" dirty="0"/>
+              <a:t>แต่ละโหนดจะคำนวณโดย เอาค่าจาก </a:t>
+            </a:r>
+            <a:r>
+              <a:rPr lang="en-US" dirty="0"/>
+              <a:t>input layer * weight </a:t>
+            </a:r>
+            <a:r>
+              <a:rPr lang="th-TH" dirty="0"/>
+              <a:t>ทั้งหมดมา </a:t>
+            </a:r>
+            <a:r>
+              <a:rPr lang="en-US" dirty="0"/>
+              <a:t>sum </a:t>
+            </a:r>
+            <a:r>
+              <a:rPr lang="th-TH" dirty="0"/>
+              <a:t>กัน จากนั้นเอาเข้า </a:t>
+            </a:r>
+            <a:r>
+              <a:rPr lang="en-US" dirty="0"/>
+              <a:t>activation function </a:t>
+            </a:r>
+            <a:r>
+              <a:rPr lang="th-TH" dirty="0"/>
+              <a:t>จะได้ค่าส่งไปยัง </a:t>
+            </a:r>
+            <a:r>
+              <a:rPr lang="en-US" dirty="0"/>
+              <a:t>node </a:t>
+            </a:r>
+            <a:r>
+              <a:rPr lang="th-TH" dirty="0"/>
+              <a:t>ต่อไป</a:t>
+            </a:r>
+            <a:endParaRPr lang="en-US" dirty="0"/>
+          </a:p>
+          <a:p>
+            <a:pPr marL="0" indent="0">
+              <a:buFontTx/>
+              <a:buNone/>
+            </a:pPr>
+            <a:endParaRPr lang="en-US" dirty="0"/>
+          </a:p>
+          <a:p>
+            <a:pPr marL="0" indent="0">
+              <a:buFontTx/>
+              <a:buNone/>
+            </a:pPr>
+            <a:r>
+              <a:rPr lang="en-US" dirty="0"/>
+              <a:t>The Activation Function</a:t>
+            </a:r>
+          </a:p>
+          <a:p>
+            <a:pPr marL="171450" indent="-171450">
+              <a:buFontTx/>
+              <a:buChar char="-"/>
+            </a:pPr>
+            <a:r>
+              <a:rPr lang="en-US" dirty="0"/>
+              <a:t>Threshold Function (if x&lt;0 then y=0, if x &gt;= 0 then y=1)</a:t>
+            </a:r>
+          </a:p>
+          <a:p>
+            <a:pPr marL="171450" indent="-171450">
+              <a:buFontTx/>
+              <a:buChar char="-"/>
+            </a:pPr>
+            <a:r>
+              <a:rPr lang="en-US" dirty="0"/>
+              <a:t>Sigmoid Function (y = 1 / (1+e^-x))</a:t>
+            </a:r>
+          </a:p>
+          <a:p>
+            <a:pPr marL="171450" indent="-171450">
+              <a:buFontTx/>
+              <a:buChar char="-"/>
+            </a:pPr>
+            <a:r>
+              <a:rPr lang="en-US" dirty="0"/>
+              <a:t>Rectifier Function (y = max(x, 0))</a:t>
+            </a:r>
+          </a:p>
+          <a:p>
+            <a:pPr marL="171450" indent="-171450">
+              <a:buFontTx/>
+              <a:buChar char="-"/>
+            </a:pPr>
+            <a:r>
+              <a:rPr lang="en-US" dirty="0"/>
+              <a:t>Hyperbolic Tangent (tanh) </a:t>
+            </a:r>
+            <a:r>
+              <a:rPr lang="th-TH" dirty="0"/>
+              <a:t>อันนี้จะคล้าย </a:t>
+            </a:r>
+            <a:r>
+              <a:rPr lang="en-US" dirty="0"/>
+              <a:t>sigmoid </a:t>
+            </a:r>
+            <a:r>
+              <a:rPr lang="th-TH" dirty="0"/>
+              <a:t>มีสูตร (</a:t>
+            </a:r>
+            <a:r>
+              <a:rPr lang="en-US" dirty="0"/>
+              <a:t>y = (1-e^-2x)/(1+e^-2x))</a:t>
+            </a:r>
+          </a:p>
+          <a:p>
+            <a:pPr marL="0" indent="0">
+              <a:buFontTx/>
+              <a:buNone/>
+            </a:pPr>
+            <a:endParaRPr lang="en-US" dirty="0"/>
+          </a:p>
+          <a:p>
+            <a:pPr rtl="0"/>
+            <a:r>
+              <a:rPr lang="en-US" sz="1200" b="0" i="0" u="none" strike="noStrike" kern="1200" dirty="0">
+                <a:solidFill>
+                  <a:schemeClr val="tx1"/>
+                </a:solidFill>
+                <a:effectLst/>
+                <a:latin typeface="+mn-lt"/>
+                <a:ea typeface="+mn-ea"/>
+                <a:cs typeface="+mn-cs"/>
+              </a:rPr>
+              <a:t>Cost Function</a:t>
+            </a:r>
+            <a:endParaRPr lang="en-US" b="0" dirty="0">
+              <a:effectLst/>
+            </a:endParaRPr>
+          </a:p>
+          <a:p>
+            <a:pPr marL="171450" indent="-171450" rtl="0" fontAlgn="base">
+              <a:buFontTx/>
+              <a:buChar char="-"/>
+            </a:pPr>
+            <a:r>
+              <a:rPr lang="th-TH" sz="1200" b="0" i="0" u="none" strike="noStrike" kern="1200" dirty="0">
+                <a:solidFill>
+                  <a:schemeClr val="tx1"/>
+                </a:solidFill>
+                <a:effectLst/>
+                <a:latin typeface="+mn-lt"/>
+                <a:ea typeface="+mn-ea"/>
+                <a:cs typeface="+mn-cs"/>
+              </a:rPr>
+              <a:t>ความต่างระหว่าง ค่าผลลัพธ์ที่คำนวณได้ กับค่าที่แท้จริง</a:t>
+            </a:r>
+            <a:endParaRPr lang="en-US" sz="1200" b="0" i="0" u="none" strike="noStrike" kern="1200" dirty="0">
+              <a:solidFill>
+                <a:schemeClr val="tx1"/>
+              </a:solidFill>
+              <a:effectLst/>
+              <a:latin typeface="+mn-lt"/>
+              <a:ea typeface="+mn-ea"/>
+              <a:cs typeface="+mn-cs"/>
+            </a:endParaRPr>
+          </a:p>
+          <a:p>
+            <a:pPr marL="171450" indent="-171450" rtl="0" fontAlgn="base">
+              <a:buFontTx/>
+              <a:buChar char="-"/>
+            </a:pPr>
+            <a:r>
+              <a:rPr lang="th-TH" sz="1200" b="0" i="0" u="none" strike="noStrike" kern="1200" dirty="0">
+                <a:solidFill>
+                  <a:schemeClr val="tx1"/>
+                </a:solidFill>
+                <a:effectLst/>
+                <a:latin typeface="+mn-lt"/>
+                <a:ea typeface="+mn-ea"/>
+                <a:cs typeface="+mn-cs"/>
+              </a:rPr>
+              <a:t>สูตรคือ </a:t>
+            </a:r>
+            <a:r>
+              <a:rPr lang="en-US" sz="1200" b="0" i="0" u="none" strike="noStrike" kern="1200" dirty="0">
+                <a:solidFill>
+                  <a:schemeClr val="tx1"/>
+                </a:solidFill>
+                <a:effectLst/>
+                <a:latin typeface="+mn-lt"/>
+                <a:ea typeface="+mn-ea"/>
+                <a:cs typeface="+mn-cs"/>
+              </a:rPr>
+              <a:t>C = ½ (y1 - y)^2</a:t>
+            </a:r>
+          </a:p>
+          <a:p>
+            <a:pPr marL="171450" indent="-171450" rtl="0" fontAlgn="base">
+              <a:buFontTx/>
+              <a:buChar char="-"/>
+            </a:pPr>
+            <a:r>
+              <a:rPr lang="th-TH" sz="1200" b="0" i="0" u="none" strike="noStrike" kern="1200" dirty="0">
+                <a:solidFill>
+                  <a:schemeClr val="tx1"/>
+                </a:solidFill>
+                <a:effectLst/>
+                <a:latin typeface="+mn-lt"/>
+                <a:ea typeface="+mn-ea"/>
+                <a:cs typeface="+mn-cs"/>
+              </a:rPr>
+              <a:t>ยิ่งน้อยยิ่งดี เพราะจะแสดงว่าค่า </a:t>
+            </a:r>
+            <a:r>
+              <a:rPr lang="en-US" sz="1200" b="0" i="0" u="none" strike="noStrike" kern="1200" dirty="0">
+                <a:solidFill>
+                  <a:schemeClr val="tx1"/>
+                </a:solidFill>
+                <a:effectLst/>
+                <a:latin typeface="+mn-lt"/>
+                <a:ea typeface="+mn-ea"/>
+                <a:cs typeface="+mn-cs"/>
+              </a:rPr>
+              <a:t>y1 </a:t>
+            </a:r>
+            <a:r>
+              <a:rPr lang="th-TH" sz="1200" b="0" i="0" u="none" strike="noStrike" kern="1200" dirty="0">
+                <a:solidFill>
+                  <a:schemeClr val="tx1"/>
+                </a:solidFill>
+                <a:effectLst/>
+                <a:latin typeface="+mn-lt"/>
+                <a:ea typeface="+mn-ea"/>
+                <a:cs typeface="+mn-cs"/>
+              </a:rPr>
+              <a:t>ที่คำนวณได้ ใกล้เคียงกับค่า </a:t>
+            </a:r>
+            <a:r>
+              <a:rPr lang="en-US" sz="1200" b="0" i="0" u="none" strike="noStrike" kern="1200" dirty="0">
+                <a:solidFill>
+                  <a:schemeClr val="tx1"/>
+                </a:solidFill>
+                <a:effectLst/>
+                <a:latin typeface="+mn-lt"/>
+                <a:ea typeface="+mn-ea"/>
+                <a:cs typeface="+mn-cs"/>
+              </a:rPr>
+              <a:t>y </a:t>
+            </a:r>
+            <a:r>
+              <a:rPr lang="th-TH" sz="1200" b="0" i="0" u="none" strike="noStrike" kern="1200" dirty="0">
+                <a:solidFill>
+                  <a:schemeClr val="tx1"/>
+                </a:solidFill>
+                <a:effectLst/>
+                <a:latin typeface="+mn-lt"/>
+                <a:ea typeface="+mn-ea"/>
+                <a:cs typeface="+mn-cs"/>
+              </a:rPr>
+              <a:t>ที่แท้จริง</a:t>
+            </a:r>
+            <a:endParaRPr lang="en-US" sz="1200" b="0" i="0" u="none" strike="noStrike" kern="1200" dirty="0">
+              <a:solidFill>
+                <a:schemeClr val="tx1"/>
+              </a:solidFill>
+              <a:effectLst/>
+              <a:latin typeface="+mn-lt"/>
+              <a:ea typeface="+mn-ea"/>
+              <a:cs typeface="+mn-cs"/>
+            </a:endParaRPr>
+          </a:p>
+          <a:p>
+            <a:pPr marL="171450" indent="-171450" rtl="0" fontAlgn="base">
+              <a:buFontTx/>
+              <a:buChar char="-"/>
+            </a:pPr>
+            <a:r>
+              <a:rPr lang="th-TH" sz="1200" b="0" i="0" u="none" strike="noStrike" kern="1200" dirty="0">
+                <a:solidFill>
+                  <a:schemeClr val="tx1"/>
+                </a:solidFill>
+                <a:effectLst/>
+                <a:latin typeface="+mn-lt"/>
+                <a:ea typeface="+mn-ea"/>
+                <a:cs typeface="+mn-cs"/>
+              </a:rPr>
+              <a:t>ซึ่งเมื่อเรารัน </a:t>
+            </a:r>
+            <a:r>
+              <a:rPr lang="en-US" sz="1200" b="0" i="0" u="none" strike="noStrike" kern="1200" dirty="0">
+                <a:solidFill>
+                  <a:schemeClr val="tx1"/>
+                </a:solidFill>
+                <a:effectLst/>
+                <a:latin typeface="+mn-lt"/>
+                <a:ea typeface="+mn-ea"/>
+                <a:cs typeface="+mn-cs"/>
+              </a:rPr>
+              <a:t>model </a:t>
+            </a:r>
+            <a:r>
+              <a:rPr lang="th-TH" sz="1200" b="0" i="0" u="none" strike="noStrike" kern="1200" dirty="0">
+                <a:solidFill>
+                  <a:schemeClr val="tx1"/>
+                </a:solidFill>
+                <a:effectLst/>
+                <a:latin typeface="+mn-lt"/>
+                <a:ea typeface="+mn-ea"/>
+                <a:cs typeface="+mn-cs"/>
+              </a:rPr>
+              <a:t>รอบแรกแล้วได้ค่า </a:t>
+            </a:r>
+            <a:r>
+              <a:rPr lang="en-US" sz="1200" b="0" i="0" u="none" strike="noStrike" kern="1200" dirty="0">
+                <a:solidFill>
+                  <a:schemeClr val="tx1"/>
+                </a:solidFill>
+                <a:effectLst/>
+                <a:latin typeface="+mn-lt"/>
+                <a:ea typeface="+mn-ea"/>
+                <a:cs typeface="+mn-cs"/>
+              </a:rPr>
+              <a:t>C </a:t>
+            </a:r>
+            <a:r>
+              <a:rPr lang="th-TH" sz="1200" b="0" i="0" u="none" strike="noStrike" kern="1200" dirty="0">
+                <a:solidFill>
+                  <a:schemeClr val="tx1"/>
+                </a:solidFill>
+                <a:effectLst/>
+                <a:latin typeface="+mn-lt"/>
+                <a:ea typeface="+mn-ea"/>
+                <a:cs typeface="+mn-cs"/>
+              </a:rPr>
+              <a:t>ที่เยอะ ก็จะย้อนกลับไปปรับค่า </a:t>
+            </a:r>
+            <a:r>
+              <a:rPr lang="en-US" sz="1200" b="0" i="0" u="none" strike="noStrike" kern="1200" dirty="0">
+                <a:solidFill>
+                  <a:schemeClr val="tx1"/>
+                </a:solidFill>
+                <a:effectLst/>
+                <a:latin typeface="+mn-lt"/>
+                <a:ea typeface="+mn-ea"/>
+                <a:cs typeface="+mn-cs"/>
+              </a:rPr>
+              <a:t>weight </a:t>
+            </a:r>
+            <a:r>
+              <a:rPr lang="th-TH" sz="1200" b="0" i="0" u="none" strike="noStrike" kern="1200" dirty="0">
+                <a:solidFill>
+                  <a:schemeClr val="tx1"/>
+                </a:solidFill>
+                <a:effectLst/>
+                <a:latin typeface="+mn-lt"/>
+                <a:ea typeface="+mn-ea"/>
+                <a:cs typeface="+mn-cs"/>
+              </a:rPr>
+              <a:t>แล้วรันใหม่ จนกว่าจะได้ค่า </a:t>
+            </a:r>
+            <a:r>
+              <a:rPr lang="en-US" sz="1200" b="0" i="0" u="none" strike="noStrike" kern="1200" dirty="0">
+                <a:solidFill>
+                  <a:schemeClr val="tx1"/>
+                </a:solidFill>
+                <a:effectLst/>
+                <a:latin typeface="+mn-lt"/>
+                <a:ea typeface="+mn-ea"/>
+                <a:cs typeface="+mn-cs"/>
+              </a:rPr>
+              <a:t>C </a:t>
+            </a:r>
+            <a:r>
+              <a:rPr lang="th-TH" sz="1200" b="0" i="0" u="none" strike="noStrike" kern="1200" dirty="0">
+                <a:solidFill>
+                  <a:schemeClr val="tx1"/>
+                </a:solidFill>
+                <a:effectLst/>
+                <a:latin typeface="+mn-lt"/>
+                <a:ea typeface="+mn-ea"/>
+                <a:cs typeface="+mn-cs"/>
+              </a:rPr>
+              <a:t>ที่น้อยที่สุด ทั้งหมดนี้เรียก </a:t>
+            </a:r>
+            <a:r>
+              <a:rPr lang="en-US" sz="1200" b="0" i="0" u="none" strike="noStrike" kern="1200" dirty="0">
+                <a:solidFill>
+                  <a:schemeClr val="tx1"/>
+                </a:solidFill>
+                <a:effectLst/>
+                <a:latin typeface="+mn-lt"/>
+                <a:ea typeface="+mn-ea"/>
+                <a:cs typeface="+mn-cs"/>
+              </a:rPr>
+              <a:t>Back Propagation Function</a:t>
+            </a:r>
+          </a:p>
+          <a:p>
+            <a:pPr rtl="0"/>
+            <a:br>
+              <a:rPr lang="en-US" b="0" dirty="0">
+                <a:effectLst/>
+              </a:rPr>
+            </a:br>
+            <a:r>
+              <a:rPr lang="en-US" sz="1200" b="0" i="0" u="none" strike="noStrike" kern="1200" dirty="0">
+                <a:solidFill>
+                  <a:schemeClr val="tx1"/>
+                </a:solidFill>
+                <a:effectLst/>
+                <a:latin typeface="+mn-lt"/>
+                <a:ea typeface="+mn-ea"/>
+                <a:cs typeface="+mn-cs"/>
+              </a:rPr>
+              <a:t>Gradient Descent</a:t>
+            </a:r>
+            <a:endParaRPr lang="en-US" b="0" dirty="0">
+              <a:effectLst/>
+            </a:endParaRPr>
+          </a:p>
+          <a:p>
+            <a:pPr marL="171450" indent="-171450" rtl="0" fontAlgn="base">
+              <a:buFontTx/>
+              <a:buChar char="-"/>
+            </a:pPr>
+            <a:r>
+              <a:rPr lang="th-TH" sz="1200" b="0" i="0" u="none" strike="noStrike" kern="1200" dirty="0">
+                <a:solidFill>
+                  <a:schemeClr val="tx1"/>
+                </a:solidFill>
+                <a:effectLst/>
+                <a:latin typeface="+mn-lt"/>
+                <a:ea typeface="+mn-ea"/>
+                <a:cs typeface="+mn-cs"/>
+              </a:rPr>
+              <a:t>รันทุกรอบให้เสร็จก่อน แล้วมาคำนวณ </a:t>
+            </a:r>
+            <a:r>
+              <a:rPr lang="en-US" sz="1200" b="0" i="0" u="none" strike="noStrike" kern="1200" dirty="0">
+                <a:solidFill>
+                  <a:schemeClr val="tx1"/>
+                </a:solidFill>
+                <a:effectLst/>
+                <a:latin typeface="+mn-lt"/>
+                <a:ea typeface="+mn-ea"/>
+                <a:cs typeface="+mn-cs"/>
+              </a:rPr>
+              <a:t>cost function </a:t>
+            </a:r>
+            <a:r>
+              <a:rPr lang="th-TH" sz="1200" b="0" i="0" u="none" strike="noStrike" kern="1200" dirty="0">
+                <a:solidFill>
+                  <a:schemeClr val="tx1"/>
+                </a:solidFill>
+                <a:effectLst/>
+                <a:latin typeface="+mn-lt"/>
+                <a:ea typeface="+mn-ea"/>
+                <a:cs typeface="+mn-cs"/>
+              </a:rPr>
+              <a:t>ทีเดียว จากนั้นจึงค่อยทำ </a:t>
+            </a:r>
+            <a:r>
+              <a:rPr lang="en-US" sz="1200" b="0" i="0" u="none" strike="noStrike" kern="1200" dirty="0">
+                <a:solidFill>
+                  <a:schemeClr val="tx1"/>
+                </a:solidFill>
+                <a:effectLst/>
+                <a:latin typeface="+mn-lt"/>
+                <a:ea typeface="+mn-ea"/>
+                <a:cs typeface="+mn-cs"/>
+              </a:rPr>
+              <a:t>back prop</a:t>
+            </a:r>
+          </a:p>
+          <a:p>
+            <a:pPr rtl="0"/>
+            <a:br>
+              <a:rPr lang="en-US" b="0" dirty="0">
+                <a:effectLst/>
+              </a:rPr>
+            </a:br>
+            <a:r>
+              <a:rPr lang="en-US" sz="1200" b="0" i="0" u="none" strike="noStrike" kern="1200" dirty="0">
+                <a:solidFill>
+                  <a:schemeClr val="tx1"/>
+                </a:solidFill>
+                <a:effectLst/>
+                <a:latin typeface="+mn-lt"/>
+                <a:ea typeface="+mn-ea"/>
+                <a:cs typeface="+mn-cs"/>
+              </a:rPr>
+              <a:t>Stochastic Gradient Descent</a:t>
+            </a:r>
+          </a:p>
+          <a:p>
+            <a:pPr marL="171450" indent="-171450" rtl="0">
+              <a:buFontTx/>
+              <a:buChar char="-"/>
+            </a:pPr>
+            <a:r>
+              <a:rPr lang="th-TH" sz="1200" b="0" i="0" u="none" strike="noStrike" kern="1200" dirty="0">
+                <a:solidFill>
+                  <a:schemeClr val="tx1"/>
+                </a:solidFill>
+                <a:effectLst/>
+                <a:latin typeface="+mn-lt"/>
+                <a:ea typeface="+mn-ea"/>
+                <a:cs typeface="+mn-cs"/>
+              </a:rPr>
+              <a:t>ในแต่ละรอบของการรัน เมื่อทำเสร็จแล้วก็คำนวณ </a:t>
+            </a:r>
+            <a:r>
+              <a:rPr lang="en-US" sz="1200" b="0" i="0" u="none" strike="noStrike" kern="1200" dirty="0">
+                <a:solidFill>
+                  <a:schemeClr val="tx1"/>
+                </a:solidFill>
+                <a:effectLst/>
+                <a:latin typeface="+mn-lt"/>
+                <a:ea typeface="+mn-ea"/>
+                <a:cs typeface="+mn-cs"/>
+              </a:rPr>
+              <a:t>cost function </a:t>
+            </a:r>
+            <a:r>
+              <a:rPr lang="th-TH" sz="1200" b="0" i="0" u="none" strike="noStrike" kern="1200" dirty="0">
+                <a:solidFill>
+                  <a:schemeClr val="tx1"/>
+                </a:solidFill>
+                <a:effectLst/>
+                <a:latin typeface="+mn-lt"/>
+                <a:ea typeface="+mn-ea"/>
+                <a:cs typeface="+mn-cs"/>
+              </a:rPr>
+              <a:t>แล้วทำ </a:t>
+            </a:r>
+            <a:r>
+              <a:rPr lang="en-US" sz="1200" b="0" i="0" u="none" strike="noStrike" kern="1200" dirty="0">
+                <a:solidFill>
+                  <a:schemeClr val="tx1"/>
+                </a:solidFill>
+                <a:effectLst/>
+                <a:latin typeface="+mn-lt"/>
+                <a:ea typeface="+mn-ea"/>
+                <a:cs typeface="+mn-cs"/>
+              </a:rPr>
+              <a:t>back prop </a:t>
+            </a:r>
+            <a:r>
+              <a:rPr lang="th-TH" sz="1200" b="0" i="0" u="none" strike="noStrike" kern="1200" dirty="0">
+                <a:solidFill>
+                  <a:schemeClr val="tx1"/>
+                </a:solidFill>
+                <a:effectLst/>
+                <a:latin typeface="+mn-lt"/>
+                <a:ea typeface="+mn-ea"/>
+                <a:cs typeface="+mn-cs"/>
+              </a:rPr>
+              <a:t>เลย</a:t>
+            </a:r>
+          </a:p>
+        </p:txBody>
+      </p:sp>
+      <p:sp>
+        <p:nvSpPr>
+          <p:cNvPr id="4" name="Slide Number Placeholder 3"/>
+          <p:cNvSpPr>
+            <a:spLocks noGrp="1"/>
+          </p:cNvSpPr>
+          <p:nvPr>
+            <p:ph type="sldNum" sz="quarter" idx="10"/>
+          </p:nvPr>
+        </p:nvSpPr>
+        <p:spPr/>
+        <p:txBody>
+          <a:bodyPr/>
+          <a:lstStyle/>
+          <a:p>
+            <a:fld id="{E6E59516-A3BF-4735-8DA9-18A21994B58E}" type="slidenum">
+              <a:rPr lang="en-US" smtClean="0"/>
+              <a:t>5</a:t>
+            </a:fld>
+            <a:endParaRPr lang="en-US"/>
+          </a:p>
+        </p:txBody>
+      </p:sp>
+    </p:spTree>
+    <p:extLst>
+      <p:ext uri="{BB962C8B-B14F-4D97-AF65-F5344CB8AC3E}">
+        <p14:creationId xmlns:p14="http://schemas.microsoft.com/office/powerpoint/2010/main" val="3391031314"/>
+      </p:ext>
+    </p:extLst>
+  </p:cSld>
+  <p:clrMapOvr>
+    <a:masterClrMapping/>
+  </p:clrMapOvr>
+</p:notes>
+</file>
+
+<file path=ppt/notesSlides/notesSlide4.xml><?xml version="1.0" encoding="utf-8"?>
+<p:notes xmlns:a="http://schemas.openxmlformats.org/drawingml/2006/main" xmlns:r="http://schemas.openxmlformats.org/officeDocument/2006/relationships" xmlns:p="http://schemas.openxmlformats.org/presentationml/2006/main">
+  <p:cSld>
+    <p:spTree>
+      <p:nvGrpSpPr>
+        <p:cNvPr id="1" name=""/>
+        <p:cNvGrpSpPr/>
+        <p:nvPr/>
+      </p:nvGrpSpPr>
+      <p:grpSpPr>
+        <a:xfrm>
+          <a:off x="0" y="0"/>
+          <a:ext cx="0" cy="0"/>
+          <a:chOff x="0" y="0"/>
+          <a:chExt cx="0" cy="0"/>
+        </a:xfrm>
+      </p:grpSpPr>
+      <p:sp>
+        <p:nvSpPr>
+          <p:cNvPr id="2" name="Slide Image Placeholder 1"/>
+          <p:cNvSpPr>
+            <a:spLocks noGrp="1" noRot="1" noChangeAspect="1"/>
+          </p:cNvSpPr>
+          <p:nvPr>
+            <p:ph type="sldImg"/>
+          </p:nvPr>
+        </p:nvSpPr>
+        <p:spPr/>
+      </p:sp>
+      <p:sp>
+        <p:nvSpPr>
+          <p:cNvPr id="3" name="Notes Placeholder 2"/>
+          <p:cNvSpPr>
+            <a:spLocks noGrp="1"/>
+          </p:cNvSpPr>
+          <p:nvPr>
+            <p:ph type="body" idx="1"/>
+          </p:nvPr>
+        </p:nvSpPr>
+        <p:spPr/>
+        <p:txBody>
+          <a:bodyPr/>
+          <a:lstStyle/>
+          <a:p>
+            <a:r>
+              <a:rPr lang="en-US" dirty="0"/>
+              <a:t>Full connect</a:t>
+            </a:r>
+          </a:p>
+        </p:txBody>
+      </p:sp>
+      <p:sp>
+        <p:nvSpPr>
+          <p:cNvPr id="4" name="Slide Number Placeholder 3"/>
+          <p:cNvSpPr>
+            <a:spLocks noGrp="1"/>
+          </p:cNvSpPr>
+          <p:nvPr>
+            <p:ph type="sldNum" sz="quarter" idx="10"/>
+          </p:nvPr>
+        </p:nvSpPr>
+        <p:spPr/>
+        <p:txBody>
+          <a:bodyPr/>
+          <a:lstStyle/>
+          <a:p>
+            <a:fld id="{E6E59516-A3BF-4735-8DA9-18A21994B58E}" type="slidenum">
+              <a:rPr lang="en-US" smtClean="0"/>
+              <a:t>7</a:t>
+            </a:fld>
+            <a:endParaRPr lang="en-US"/>
+          </a:p>
+        </p:txBody>
+      </p:sp>
+    </p:spTree>
+    <p:extLst>
+      <p:ext uri="{BB962C8B-B14F-4D97-AF65-F5344CB8AC3E}">
+        <p14:creationId xmlns:p14="http://schemas.microsoft.com/office/powerpoint/2010/main" val="1024067861"/>
+      </p:ext>
+    </p:extLst>
+  </p:cSld>
+  <p:clrMapOvr>
+    <a:masterClrMapping/>
+  </p:clrMapOvr>
+</p:notes>
+</file>
+
+<file path=ppt/notesSlides/notesSlide5.xml><?xml version="1.0" encoding="utf-8"?>
+<p:notes xmlns:a="http://schemas.openxmlformats.org/drawingml/2006/main" xmlns:r="http://schemas.openxmlformats.org/officeDocument/2006/relationships" xmlns:p="http://schemas.openxmlformats.org/presentationml/2006/main">
+  <p:cSld>
+    <p:spTree>
+      <p:nvGrpSpPr>
+        <p:cNvPr id="1" name=""/>
+        <p:cNvGrpSpPr/>
+        <p:nvPr/>
+      </p:nvGrpSpPr>
+      <p:grpSpPr>
+        <a:xfrm>
+          <a:off x="0" y="0"/>
+          <a:ext cx="0" cy="0"/>
+          <a:chOff x="0" y="0"/>
+          <a:chExt cx="0" cy="0"/>
+        </a:xfrm>
+      </p:grpSpPr>
+      <p:sp>
+        <p:nvSpPr>
+          <p:cNvPr id="2" name="Slide Image Placeholder 1"/>
+          <p:cNvSpPr>
+            <a:spLocks noGrp="1" noRot="1" noChangeAspect="1"/>
+          </p:cNvSpPr>
+          <p:nvPr>
+            <p:ph type="sldImg"/>
+          </p:nvPr>
+        </p:nvSpPr>
+        <p:spPr/>
+      </p:sp>
+      <p:sp>
+        <p:nvSpPr>
+          <p:cNvPr id="3" name="Notes Placeholder 2"/>
+          <p:cNvSpPr>
+            <a:spLocks noGrp="1"/>
+          </p:cNvSpPr>
+          <p:nvPr>
+            <p:ph type="body" idx="1"/>
+          </p:nvPr>
+        </p:nvSpPr>
+        <p:spPr/>
+        <p:txBody>
+          <a:bodyPr/>
+          <a:lstStyle/>
+          <a:p>
+            <a:r>
+              <a:rPr lang="en-US" dirty="0"/>
+              <a:t>[[0</a:t>
+            </a:r>
+            <a:r>
+              <a:rPr lang="en-US" baseline="0" dirty="0"/>
+              <a:t> </a:t>
+            </a:r>
+            <a:r>
+              <a:rPr lang="th-TH" baseline="0" dirty="0"/>
+              <a:t>ทาย </a:t>
+            </a:r>
+            <a:r>
+              <a:rPr lang="en-US" baseline="0" dirty="0"/>
+              <a:t>0, 0</a:t>
+            </a:r>
+            <a:r>
+              <a:rPr lang="th-TH" baseline="0" dirty="0"/>
+              <a:t> ทาย </a:t>
+            </a:r>
+            <a:r>
+              <a:rPr lang="en-US" baseline="0" dirty="0"/>
+              <a:t>1]</a:t>
+            </a:r>
+          </a:p>
+          <a:p>
+            <a:r>
+              <a:rPr lang="en-US" dirty="0"/>
+              <a:t> [1</a:t>
+            </a:r>
+            <a:r>
+              <a:rPr lang="en-US" baseline="0" dirty="0"/>
+              <a:t> </a:t>
+            </a:r>
+            <a:r>
+              <a:rPr lang="th-TH" baseline="0" dirty="0"/>
+              <a:t>ทาย </a:t>
+            </a:r>
+            <a:r>
+              <a:rPr lang="en-US" baseline="0" dirty="0"/>
+              <a:t>0, 1</a:t>
+            </a:r>
+            <a:r>
+              <a:rPr lang="th-TH" baseline="0" dirty="0"/>
+              <a:t> ทาย </a:t>
+            </a:r>
+            <a:r>
+              <a:rPr lang="en-US" baseline="0" dirty="0"/>
+              <a:t>1]]</a:t>
+            </a:r>
+          </a:p>
+          <a:p>
+            <a:endParaRPr lang="en-US" baseline="0" dirty="0"/>
+          </a:p>
+          <a:p>
+            <a:r>
+              <a:rPr lang="en-US" baseline="0" dirty="0"/>
+              <a:t>Dense </a:t>
+            </a:r>
+            <a:r>
+              <a:rPr lang="th-TH" baseline="0" dirty="0"/>
+              <a:t>เอาไว้ทำ </a:t>
+            </a:r>
+            <a:r>
+              <a:rPr lang="en-US" baseline="0" dirty="0"/>
+              <a:t>full connected</a:t>
+            </a:r>
+            <a:endParaRPr lang="en-US" dirty="0"/>
+          </a:p>
+        </p:txBody>
+      </p:sp>
+      <p:sp>
+        <p:nvSpPr>
+          <p:cNvPr id="4" name="Slide Number Placeholder 3"/>
+          <p:cNvSpPr>
+            <a:spLocks noGrp="1"/>
+          </p:cNvSpPr>
+          <p:nvPr>
+            <p:ph type="sldNum" sz="quarter" idx="10"/>
+          </p:nvPr>
+        </p:nvSpPr>
+        <p:spPr/>
+        <p:txBody>
+          <a:bodyPr/>
+          <a:lstStyle/>
+          <a:p>
+            <a:fld id="{E6E59516-A3BF-4735-8DA9-18A21994B58E}" type="slidenum">
+              <a:rPr lang="en-US" smtClean="0"/>
+              <a:t>8</a:t>
+            </a:fld>
+            <a:endParaRPr lang="en-US"/>
+          </a:p>
+        </p:txBody>
+      </p:sp>
+    </p:spTree>
+    <p:extLst>
+      <p:ext uri="{BB962C8B-B14F-4D97-AF65-F5344CB8AC3E}">
+        <p14:creationId xmlns:p14="http://schemas.microsoft.com/office/powerpoint/2010/main" val="650020246"/>
+      </p:ext>
+    </p:extLst>
+  </p:cSld>
+  <p:clrMapOvr>
+    <a:masterClrMapping/>
+  </p:clrMapOvr>
+</p:notes>
+</file>
+
+<file path=ppt/notesSlides/notesSlide6.xml><?xml version="1.0" encoding="utf-8"?>
+<p:notes xmlns:a="http://schemas.openxmlformats.org/drawingml/2006/main" xmlns:r="http://schemas.openxmlformats.org/officeDocument/2006/relationships" xmlns:p="http://schemas.openxmlformats.org/presentationml/2006/main">
+  <p:cSld>
+    <p:spTree>
+      <p:nvGrpSpPr>
+        <p:cNvPr id="1" name=""/>
+        <p:cNvGrpSpPr/>
+        <p:nvPr/>
+      </p:nvGrpSpPr>
+      <p:grpSpPr>
+        <a:xfrm>
+          <a:off x="0" y="0"/>
+          <a:ext cx="0" cy="0"/>
+          <a:chOff x="0" y="0"/>
+          <a:chExt cx="0" cy="0"/>
+        </a:xfrm>
+      </p:grpSpPr>
+      <p:sp>
+        <p:nvSpPr>
+          <p:cNvPr id="2" name="Slide Image Placeholder 1"/>
+          <p:cNvSpPr>
+            <a:spLocks noGrp="1" noRot="1" noChangeAspect="1"/>
+          </p:cNvSpPr>
+          <p:nvPr>
+            <p:ph type="sldImg"/>
+          </p:nvPr>
+        </p:nvSpPr>
+        <p:spPr/>
+      </p:sp>
+      <p:sp>
+        <p:nvSpPr>
+          <p:cNvPr id="3" name="Notes Placeholder 2"/>
+          <p:cNvSpPr>
+            <a:spLocks noGrp="1"/>
+          </p:cNvSpPr>
+          <p:nvPr>
+            <p:ph type="body" idx="1"/>
+          </p:nvPr>
+        </p:nvSpPr>
+        <p:spPr/>
+        <p:txBody>
+          <a:bodyPr/>
+          <a:lstStyle/>
+          <a:p>
+            <a:r>
+              <a:rPr lang="en-US" dirty="0"/>
+              <a:t>Convolution</a:t>
+            </a:r>
+          </a:p>
+          <a:p>
+            <a:pPr marL="171450" indent="-171450">
+              <a:buFont typeface="Arial" panose="020B0604020202020204" pitchFamily="34" charset="0"/>
+              <a:buChar char="•"/>
+            </a:pPr>
+            <a:r>
+              <a:rPr lang="en-US" dirty="0"/>
+              <a:t>Input Image *</a:t>
+            </a:r>
+            <a:r>
+              <a:rPr lang="en-US" baseline="0" dirty="0"/>
+              <a:t> Feature Factor = Feature Map</a:t>
+            </a:r>
+          </a:p>
+          <a:p>
+            <a:pPr marL="171450" indent="-171450">
+              <a:buFont typeface="Arial" panose="020B0604020202020204" pitchFamily="34" charset="0"/>
+              <a:buChar char="•"/>
+            </a:pPr>
+            <a:r>
+              <a:rPr lang="th-TH" baseline="0" dirty="0"/>
+              <a:t>ทำให้ </a:t>
+            </a:r>
+            <a:r>
+              <a:rPr lang="en-US" baseline="0" dirty="0"/>
+              <a:t>input image smaller -&gt; process smaller</a:t>
+            </a:r>
+            <a:endParaRPr lang="th-TH" baseline="0" dirty="0"/>
+          </a:p>
+          <a:p>
+            <a:pPr marL="171450" indent="-171450">
+              <a:buFont typeface="Arial" panose="020B0604020202020204" pitchFamily="34" charset="0"/>
+              <a:buChar char="•"/>
+            </a:pPr>
+            <a:r>
+              <a:rPr lang="en-US" baseline="0" dirty="0" err="1"/>
+              <a:t>ReLU</a:t>
+            </a:r>
+            <a:r>
+              <a:rPr lang="en-US" baseline="0" dirty="0"/>
+              <a:t> = Rectifier Linear Unit</a:t>
+            </a:r>
+          </a:p>
+          <a:p>
+            <a:pPr marL="0" indent="0">
+              <a:buFont typeface="Arial" panose="020B0604020202020204" pitchFamily="34" charset="0"/>
+              <a:buNone/>
+            </a:pPr>
+            <a:endParaRPr lang="en-US" baseline="0" dirty="0"/>
+          </a:p>
+          <a:p>
+            <a:pPr marL="0" indent="0">
+              <a:buFont typeface="Arial" panose="020B0604020202020204" pitchFamily="34" charset="0"/>
+              <a:buNone/>
+            </a:pPr>
+            <a:r>
+              <a:rPr lang="en-US" baseline="0" dirty="0"/>
+              <a:t>Pooling</a:t>
+            </a:r>
+          </a:p>
+          <a:p>
+            <a:pPr marL="171450" indent="-171450">
+              <a:buFont typeface="Arial" panose="020B0604020202020204" pitchFamily="34" charset="0"/>
+              <a:buChar char="•"/>
+            </a:pPr>
+            <a:r>
+              <a:rPr lang="th-TH" baseline="0" dirty="0"/>
+              <a:t>เพื่อให้ต่อให้รูปถูกหมุน ตะแคง มีสภาพแวดล้อมรอบๆ เปลี่ยนไป ก็ยัง </a:t>
+            </a:r>
+            <a:r>
+              <a:rPr lang="en-US" baseline="0" dirty="0"/>
+              <a:t>detect </a:t>
+            </a:r>
+            <a:r>
+              <a:rPr lang="th-TH" baseline="0" dirty="0"/>
+              <a:t>ได้อยู่</a:t>
+            </a:r>
+            <a:endParaRPr lang="en-US" baseline="0" dirty="0"/>
+          </a:p>
+          <a:p>
+            <a:pPr marL="0" indent="0">
+              <a:buFont typeface="Arial" panose="020B0604020202020204" pitchFamily="34" charset="0"/>
+              <a:buNone/>
+            </a:pPr>
+            <a:endParaRPr lang="en-US" baseline="0" dirty="0"/>
+          </a:p>
+          <a:p>
+            <a:pPr marL="0" indent="0">
+              <a:buFont typeface="Arial" panose="020B0604020202020204" pitchFamily="34" charset="0"/>
+              <a:buNone/>
+            </a:pPr>
+            <a:r>
+              <a:rPr lang="en-US" baseline="0" dirty="0"/>
+              <a:t>Flatten</a:t>
+            </a:r>
+          </a:p>
+          <a:p>
+            <a:pPr marL="171450" indent="-171450">
+              <a:buFont typeface="Arial" panose="020B0604020202020204" pitchFamily="34" charset="0"/>
+              <a:buChar char="•"/>
+            </a:pPr>
+            <a:r>
+              <a:rPr lang="th-TH" baseline="0" dirty="0"/>
+              <a:t>การแปลง </a:t>
+            </a:r>
+            <a:r>
+              <a:rPr lang="en-US" baseline="0" dirty="0"/>
+              <a:t>array 2</a:t>
+            </a:r>
+            <a:r>
+              <a:rPr lang="th-TH" baseline="0" dirty="0"/>
+              <a:t> มิติ ให้กลายเป็น </a:t>
+            </a:r>
+            <a:r>
+              <a:rPr lang="en-US" baseline="0" dirty="0"/>
+              <a:t>vector</a:t>
+            </a:r>
+          </a:p>
+          <a:p>
+            <a:pPr marL="171450" indent="-171450">
+              <a:buFont typeface="Arial" panose="020B0604020202020204" pitchFamily="34" charset="0"/>
+              <a:buChar char="•"/>
+            </a:pPr>
+            <a:r>
+              <a:rPr lang="th-TH" baseline="0" dirty="0"/>
+              <a:t>1. สาเหตุที่เราต้องทำเป็น </a:t>
+            </a:r>
+            <a:r>
+              <a:rPr lang="en-US" baseline="0" dirty="0"/>
+              <a:t>flatten </a:t>
+            </a:r>
+            <a:r>
+              <a:rPr lang="th-TH" baseline="0" dirty="0"/>
+              <a:t>เพราะว่า ตอนทำ </a:t>
+            </a:r>
+            <a:r>
+              <a:rPr lang="en-US" baseline="0" dirty="0" err="1"/>
+              <a:t>featue</a:t>
+            </a:r>
+            <a:r>
+              <a:rPr lang="en-US" baseline="0" dirty="0"/>
+              <a:t> map </a:t>
+            </a:r>
+            <a:r>
+              <a:rPr lang="th-TH" baseline="0" dirty="0"/>
+              <a:t>เราเลือกค่าที่สูงที่สุดที่แสดงความสัมพันธ์ของ </a:t>
+            </a:r>
+            <a:r>
+              <a:rPr lang="en-US" baseline="0" dirty="0"/>
+              <a:t>pixel (high number </a:t>
+            </a:r>
+            <a:r>
+              <a:rPr lang="th-TH" baseline="0" dirty="0"/>
+              <a:t>ใน </a:t>
+            </a:r>
+            <a:r>
+              <a:rPr lang="en-US" baseline="0" dirty="0"/>
+              <a:t>feature map </a:t>
+            </a:r>
+            <a:r>
+              <a:rPr lang="th-TH" baseline="0" dirty="0"/>
+              <a:t>สัมพันธ์กับ </a:t>
+            </a:r>
+            <a:r>
+              <a:rPr lang="en-US" baseline="0" dirty="0"/>
+              <a:t>specific feature </a:t>
+            </a:r>
+            <a:r>
+              <a:rPr lang="th-TH" baseline="0" dirty="0"/>
+              <a:t>ใน </a:t>
+            </a:r>
+            <a:r>
+              <a:rPr lang="en-US" baseline="0" dirty="0"/>
+              <a:t>input </a:t>
+            </a:r>
+            <a:r>
+              <a:rPr lang="en-US" baseline="0"/>
+              <a:t>image)</a:t>
+            </a:r>
+          </a:p>
+          <a:p>
+            <a:pPr marL="171450" indent="-171450">
+              <a:buFont typeface="Arial" panose="020B0604020202020204" pitchFamily="34" charset="0"/>
+              <a:buChar char="•"/>
+            </a:pPr>
+            <a:r>
+              <a:rPr lang="en-US" baseline="0"/>
+              <a:t>2</a:t>
+            </a:r>
+            <a:r>
+              <a:rPr lang="en-US" baseline="0" dirty="0"/>
+              <a:t>. </a:t>
+            </a:r>
+            <a:r>
+              <a:rPr lang="th-TH" baseline="0" dirty="0"/>
+              <a:t>สาเหตุที่เราไม่สามารถเอา </a:t>
+            </a:r>
+            <a:r>
+              <a:rPr lang="en-US" baseline="0" dirty="0"/>
+              <a:t>input image </a:t>
+            </a:r>
+            <a:r>
+              <a:rPr lang="th-TH" baseline="0" dirty="0"/>
+              <a:t>มาใส่ </a:t>
+            </a:r>
+            <a:r>
+              <a:rPr lang="en-US" baseline="0" dirty="0"/>
+              <a:t>flatten </a:t>
+            </a:r>
+            <a:r>
+              <a:rPr lang="th-TH" baseline="0" dirty="0"/>
+              <a:t>เลย เพราะว่า เราจะไม่ได้ความสัมพันธ์ระหว่าง </a:t>
+            </a:r>
+            <a:r>
+              <a:rPr lang="en-US" baseline="0" dirty="0"/>
+              <a:t>pixel </a:t>
+            </a:r>
+            <a:r>
+              <a:rPr lang="th-TH" baseline="0" dirty="0"/>
+              <a:t>นี้กับ </a:t>
+            </a:r>
+            <a:r>
+              <a:rPr lang="en-US" baseline="0" dirty="0"/>
+              <a:t>pixel </a:t>
+            </a:r>
+            <a:r>
+              <a:rPr lang="th-TH" baseline="0" dirty="0"/>
+              <a:t>ข้างๆ ทำให้ไม่รู้ </a:t>
+            </a:r>
+            <a:r>
+              <a:rPr lang="en-US" baseline="0" dirty="0"/>
+              <a:t>structure </a:t>
+            </a:r>
+            <a:r>
+              <a:rPr lang="th-TH" baseline="0" dirty="0"/>
+              <a:t>ที่แท้จริง</a:t>
+            </a:r>
+            <a:endParaRPr lang="en-US" baseline="0" dirty="0"/>
+          </a:p>
+          <a:p>
+            <a:pPr marL="0" indent="0">
+              <a:buFont typeface="Arial" panose="020B0604020202020204" pitchFamily="34" charset="0"/>
+              <a:buNone/>
+            </a:pPr>
+            <a:endParaRPr lang="en-US" baseline="0" dirty="0"/>
+          </a:p>
+          <a:p>
+            <a:pPr marL="0" indent="0">
+              <a:buFont typeface="Arial" panose="020B0604020202020204" pitchFamily="34" charset="0"/>
+              <a:buNone/>
+            </a:pPr>
+            <a:r>
+              <a:rPr lang="en-US" baseline="0" dirty="0"/>
+              <a:t>Full connected</a:t>
+            </a:r>
+          </a:p>
+          <a:p>
+            <a:pPr marL="171450" indent="-171450">
+              <a:buFont typeface="Arial" panose="020B0604020202020204" pitchFamily="34" charset="0"/>
+              <a:buChar char="•"/>
+            </a:pPr>
+            <a:r>
+              <a:rPr lang="th-TH" baseline="0" dirty="0"/>
+              <a:t>ทุก </a:t>
+            </a:r>
+            <a:r>
+              <a:rPr lang="en-US" baseline="0" dirty="0"/>
+              <a:t>neural </a:t>
+            </a:r>
+            <a:r>
+              <a:rPr lang="th-TH" baseline="0" dirty="0"/>
+              <a:t>ต่อกันหมด</a:t>
+            </a:r>
+            <a:endParaRPr lang="en-US" dirty="0"/>
+          </a:p>
+          <a:p>
+            <a:endParaRPr lang="en-US" dirty="0"/>
+          </a:p>
+          <a:p>
+            <a:r>
+              <a:rPr lang="en-US" dirty="0" err="1"/>
+              <a:t>Softmax</a:t>
+            </a:r>
+            <a:endParaRPr lang="en-US" dirty="0"/>
+          </a:p>
+          <a:p>
+            <a:pPr marL="171450" indent="-171450">
+              <a:buFont typeface="Arial" panose="020B0604020202020204" pitchFamily="34" charset="0"/>
+              <a:buChar char="•"/>
+            </a:pPr>
+            <a:r>
+              <a:rPr lang="th-TH" dirty="0"/>
+              <a:t>งาน </a:t>
+            </a:r>
+            <a:r>
+              <a:rPr lang="en-US" dirty="0"/>
+              <a:t>classification </a:t>
+            </a:r>
+            <a:r>
+              <a:rPr lang="th-TH" dirty="0"/>
+              <a:t>ดังนั้นเราจะใช้ </a:t>
+            </a:r>
+            <a:r>
+              <a:rPr lang="en-US" dirty="0"/>
+              <a:t>loss function </a:t>
+            </a:r>
+            <a:r>
+              <a:rPr lang="th-TH" dirty="0"/>
+              <a:t>คือ </a:t>
+            </a:r>
+            <a:r>
+              <a:rPr lang="en-US" dirty="0"/>
+              <a:t>Cross Entropy </a:t>
+            </a:r>
+          </a:p>
+          <a:p>
+            <a:pPr marL="171450" indent="-171450">
+              <a:buFont typeface="Arial" panose="020B0604020202020204" pitchFamily="34" charset="0"/>
+              <a:buChar char="•"/>
+            </a:pPr>
+            <a:r>
+              <a:rPr lang="th-TH" dirty="0"/>
+              <a:t>ควรทราบว่า </a:t>
+            </a:r>
+            <a:r>
+              <a:rPr lang="en-US" dirty="0"/>
+              <a:t>loss function </a:t>
+            </a:r>
+            <a:r>
+              <a:rPr lang="th-TH" dirty="0"/>
+              <a:t>อันนี้ต้องใช้คู่กับ </a:t>
+            </a:r>
+            <a:r>
+              <a:rPr lang="en-US" dirty="0" err="1"/>
+              <a:t>softmax</a:t>
+            </a:r>
+            <a:r>
+              <a:rPr lang="en-US" dirty="0"/>
+              <a:t> activation </a:t>
+            </a:r>
+          </a:p>
+          <a:p>
+            <a:pPr marL="171450" indent="-171450">
+              <a:buFont typeface="Arial" panose="020B0604020202020204" pitchFamily="34" charset="0"/>
+              <a:buChar char="•"/>
+            </a:pPr>
+            <a:r>
+              <a:rPr lang="th-TH" dirty="0"/>
+              <a:t>เพราะในการคำนวณ </a:t>
+            </a:r>
+            <a:r>
+              <a:rPr lang="en-US" dirty="0"/>
+              <a:t>entropy </a:t>
+            </a:r>
+            <a:r>
+              <a:rPr lang="th-TH" dirty="0"/>
+              <a:t>นั้นเราต้องการตีความข้อมูลส่งออกจาก </a:t>
+            </a:r>
+            <a:r>
+              <a:rPr lang="en-US" dirty="0"/>
+              <a:t>NN </a:t>
+            </a:r>
+            <a:r>
+              <a:rPr lang="th-TH" dirty="0"/>
+              <a:t>นี้ในเชิงความน่าจะเป็น ซึ่งหนึ่งในข้อแม้ก็คือผลรวมของค่าส่งออกทุกค่าต้องเท่ากับ 1 ซึ่งข้อแม้นี้นั้นเป็นจริงเมื่อใช้ </a:t>
+            </a:r>
+            <a:r>
+              <a:rPr lang="en-US" dirty="0" err="1"/>
+              <a:t>softmax</a:t>
+            </a:r>
+            <a:endParaRPr lang="en-US" dirty="0"/>
+          </a:p>
+        </p:txBody>
+      </p:sp>
+      <p:sp>
+        <p:nvSpPr>
+          <p:cNvPr id="4" name="Slide Number Placeholder 3"/>
+          <p:cNvSpPr>
+            <a:spLocks noGrp="1"/>
+          </p:cNvSpPr>
+          <p:nvPr>
+            <p:ph type="sldNum" sz="quarter" idx="10"/>
+          </p:nvPr>
+        </p:nvSpPr>
+        <p:spPr/>
+        <p:txBody>
+          <a:bodyPr/>
+          <a:lstStyle/>
+          <a:p>
+            <a:fld id="{E6E59516-A3BF-4735-8DA9-18A21994B58E}" type="slidenum">
+              <a:rPr lang="en-US" smtClean="0"/>
+              <a:t>9</a:t>
+            </a:fld>
+            <a:endParaRPr lang="en-US"/>
+          </a:p>
+        </p:txBody>
+      </p:sp>
+    </p:spTree>
+    <p:extLst>
+      <p:ext uri="{BB962C8B-B14F-4D97-AF65-F5344CB8AC3E}">
+        <p14:creationId xmlns:p14="http://schemas.microsoft.com/office/powerpoint/2010/main" val="406103603"/>
+      </p:ext>
+    </p:extLst>
+  </p:cSld>
+  <p:clrMapOvr>
+    <a:masterClrMapping/>
+  </p:clrMapOvr>
+</p:notes>
+</file>
+
+<file path=ppt/notesSlides/notesSlide7.xml><?xml version="1.0" encoding="utf-8"?>
+<p:notes xmlns:a="http://schemas.openxmlformats.org/drawingml/2006/main" xmlns:r="http://schemas.openxmlformats.org/officeDocument/2006/relationships" xmlns:p="http://schemas.openxmlformats.org/presentationml/2006/main">
+  <p:cSld>
+    <p:spTree>
+      <p:nvGrpSpPr>
+        <p:cNvPr id="1" name=""/>
+        <p:cNvGrpSpPr/>
+        <p:nvPr/>
+      </p:nvGrpSpPr>
+      <p:grpSpPr>
+        <a:xfrm>
+          <a:off x="0" y="0"/>
+          <a:ext cx="0" cy="0"/>
+          <a:chOff x="0" y="0"/>
+          <a:chExt cx="0" cy="0"/>
+        </a:xfrm>
+      </p:grpSpPr>
+      <p:sp>
+        <p:nvSpPr>
+          <p:cNvPr id="2" name="Slide Image Placeholder 1"/>
+          <p:cNvSpPr>
+            <a:spLocks noGrp="1" noRot="1" noChangeAspect="1"/>
+          </p:cNvSpPr>
+          <p:nvPr>
+            <p:ph type="sldImg"/>
+          </p:nvPr>
+        </p:nvSpPr>
+        <p:spPr/>
+      </p:sp>
+      <p:sp>
+        <p:nvSpPr>
+          <p:cNvPr id="3" name="Notes Placeholder 2"/>
+          <p:cNvSpPr>
+            <a:spLocks noGrp="1"/>
+          </p:cNvSpPr>
+          <p:nvPr>
+            <p:ph type="body" idx="1"/>
+          </p:nvPr>
+        </p:nvSpPr>
+        <p:spPr/>
+        <p:txBody>
+          <a:bodyPr/>
+          <a:lstStyle/>
+          <a:p>
+            <a:r>
+              <a:rPr lang="en-US" dirty="0"/>
+              <a:t>Convolution2D(64, 3,</a:t>
+            </a:r>
+            <a:r>
+              <a:rPr lang="en-US" baseline="0" dirty="0"/>
+              <a:t> 3</a:t>
+            </a:r>
+          </a:p>
+          <a:p>
+            <a:r>
+              <a:rPr lang="en-US" baseline="0"/>
+              <a:t>32 </a:t>
+            </a:r>
+            <a:r>
+              <a:rPr lang="en-US" baseline="0" dirty="0"/>
+              <a:t>= </a:t>
+            </a:r>
+            <a:r>
+              <a:rPr lang="th-TH" baseline="0" dirty="0"/>
+              <a:t>จำนวน </a:t>
+            </a:r>
+            <a:r>
+              <a:rPr lang="en-US" baseline="0" dirty="0"/>
+              <a:t>feature detector</a:t>
+            </a:r>
+          </a:p>
+          <a:p>
+            <a:r>
+              <a:rPr lang="en-US" baseline="0" dirty="0"/>
+              <a:t>3 = </a:t>
+            </a:r>
+            <a:r>
+              <a:rPr lang="th-TH" baseline="0" dirty="0"/>
+              <a:t>จำนวน </a:t>
+            </a:r>
+            <a:r>
+              <a:rPr lang="en-US" baseline="0" dirty="0"/>
+              <a:t>row</a:t>
+            </a:r>
+            <a:endParaRPr lang="th-TH" baseline="0" dirty="0"/>
+          </a:p>
+          <a:p>
+            <a:pPr marL="0" marR="0" lvl="0" indent="0" algn="l" defTabSz="914400" rtl="0" eaLnBrk="1" fontAlgn="auto" latinLnBrk="0" hangingPunct="1">
+              <a:lnSpc>
+                <a:spcPct val="100000"/>
+              </a:lnSpc>
+              <a:spcBef>
+                <a:spcPts val="0"/>
+              </a:spcBef>
+              <a:spcAft>
+                <a:spcPts val="0"/>
+              </a:spcAft>
+              <a:buClrTx/>
+              <a:buSzTx/>
+              <a:buFontTx/>
+              <a:buNone/>
+              <a:tabLst/>
+              <a:defRPr/>
+            </a:pPr>
+            <a:r>
+              <a:rPr lang="en-US" baseline="0" dirty="0"/>
+              <a:t>3 = </a:t>
+            </a:r>
+            <a:r>
+              <a:rPr lang="th-TH" baseline="0" dirty="0"/>
+              <a:t>จำนวน </a:t>
+            </a:r>
+            <a:r>
+              <a:rPr lang="en-US" baseline="0" dirty="0"/>
+              <a:t>column</a:t>
+            </a:r>
+            <a:endParaRPr lang="th-TH" baseline="0" dirty="0"/>
+          </a:p>
+          <a:p>
+            <a:pPr marL="0" marR="0" lvl="0" indent="0" algn="l" defTabSz="914400" rtl="0" eaLnBrk="1" fontAlgn="auto" latinLnBrk="0" hangingPunct="1">
+              <a:lnSpc>
+                <a:spcPct val="100000"/>
+              </a:lnSpc>
+              <a:spcBef>
+                <a:spcPts val="0"/>
+              </a:spcBef>
+              <a:spcAft>
+                <a:spcPts val="0"/>
+              </a:spcAft>
+              <a:buClrTx/>
+              <a:buSzTx/>
+              <a:buFontTx/>
+              <a:buNone/>
+              <a:tabLst/>
+              <a:defRPr/>
+            </a:pPr>
+            <a:r>
+              <a:rPr lang="en-US" baseline="0" dirty="0"/>
+              <a:t>Input shape </a:t>
+            </a:r>
+            <a:r>
+              <a:rPr lang="th-TH" baseline="0" dirty="0"/>
+              <a:t>เพราะรูปไม่ได้เท่ากันหมด และรูปสีเป็น </a:t>
+            </a:r>
+            <a:r>
+              <a:rPr lang="en-US" baseline="0" dirty="0"/>
+              <a:t>3 </a:t>
+            </a:r>
+            <a:r>
+              <a:rPr lang="th-TH" baseline="0" dirty="0"/>
+              <a:t>มิติ ขาวดำเป็น </a:t>
+            </a:r>
+            <a:r>
+              <a:rPr lang="en-US" baseline="0" dirty="0"/>
+              <a:t>2 </a:t>
+            </a:r>
+            <a:r>
+              <a:rPr lang="th-TH" baseline="0" dirty="0"/>
+              <a:t>มิติ (</a:t>
+            </a:r>
+            <a:r>
+              <a:rPr lang="en-US" baseline="0" dirty="0"/>
+              <a:t>3, 64, 64</a:t>
+            </a:r>
+            <a:r>
+              <a:rPr lang="th-TH" baseline="0" dirty="0"/>
+              <a:t>)</a:t>
+            </a:r>
+            <a:r>
+              <a:rPr lang="en-US" baseline="0" dirty="0"/>
+              <a:t> </a:t>
+            </a:r>
+            <a:r>
+              <a:rPr lang="th-TH" baseline="0" dirty="0"/>
+              <a:t>เป็น </a:t>
+            </a:r>
+            <a:r>
+              <a:rPr lang="en-US" baseline="0" dirty="0" err="1"/>
+              <a:t>Theano</a:t>
+            </a:r>
+            <a:r>
+              <a:rPr lang="en-US" baseline="0" dirty="0"/>
+              <a:t> (64, 64, 3) </a:t>
+            </a:r>
+            <a:r>
+              <a:rPr lang="th-TH" baseline="0" dirty="0"/>
+              <a:t>เป็น </a:t>
+            </a:r>
+            <a:r>
+              <a:rPr lang="en-US" baseline="0" dirty="0" err="1"/>
+              <a:t>TensorFlow</a:t>
+            </a:r>
+            <a:endParaRPr lang="en-US" baseline="0" dirty="0"/>
+          </a:p>
+          <a:p>
+            <a:pPr marL="0" marR="0" lvl="0" indent="0" algn="l" defTabSz="914400" rtl="0" eaLnBrk="1" fontAlgn="auto" latinLnBrk="0" hangingPunct="1">
+              <a:lnSpc>
+                <a:spcPct val="100000"/>
+              </a:lnSpc>
+              <a:spcBef>
+                <a:spcPts val="0"/>
+              </a:spcBef>
+              <a:spcAft>
+                <a:spcPts val="0"/>
+              </a:spcAft>
+              <a:buClrTx/>
+              <a:buSzTx/>
+              <a:buFontTx/>
+              <a:buNone/>
+              <a:tabLst/>
+              <a:defRPr/>
+            </a:pPr>
+            <a:r>
+              <a:rPr lang="en-US" baseline="0" dirty="0"/>
+              <a:t>Max pooling 2x2 </a:t>
+            </a:r>
+            <a:r>
+              <a:rPr lang="th-TH" baseline="0" dirty="0"/>
+              <a:t>มาจากเลือกค่าที่มากที่สุดใน </a:t>
+            </a:r>
+            <a:r>
+              <a:rPr lang="en-US" baseline="0" dirty="0"/>
+              <a:t>matrix 2x2 </a:t>
+            </a:r>
+            <a:r>
+              <a:rPr lang="th-TH" baseline="0" dirty="0"/>
+              <a:t>มา </a:t>
+            </a:r>
+            <a:r>
+              <a:rPr lang="en-US" baseline="0" dirty="0"/>
+              <a:t>1 </a:t>
+            </a:r>
+            <a:r>
+              <a:rPr lang="th-TH" baseline="0" dirty="0"/>
+              <a:t>อัน</a:t>
+            </a:r>
+          </a:p>
+        </p:txBody>
+      </p:sp>
+      <p:sp>
+        <p:nvSpPr>
+          <p:cNvPr id="4" name="Slide Number Placeholder 3"/>
+          <p:cNvSpPr>
+            <a:spLocks noGrp="1"/>
+          </p:cNvSpPr>
+          <p:nvPr>
+            <p:ph type="sldNum" sz="quarter" idx="10"/>
+          </p:nvPr>
+        </p:nvSpPr>
+        <p:spPr/>
+        <p:txBody>
+          <a:bodyPr/>
+          <a:lstStyle/>
+          <a:p>
+            <a:fld id="{E6E59516-A3BF-4735-8DA9-18A21994B58E}" type="slidenum">
+              <a:rPr lang="en-US" smtClean="0"/>
+              <a:t>10</a:t>
+            </a:fld>
+            <a:endParaRPr lang="en-US"/>
+          </a:p>
+        </p:txBody>
+      </p:sp>
+    </p:spTree>
+    <p:extLst>
+      <p:ext uri="{BB962C8B-B14F-4D97-AF65-F5344CB8AC3E}">
+        <p14:creationId xmlns:p14="http://schemas.microsoft.com/office/powerpoint/2010/main" val="284783222"/>
+      </p:ext>
+    </p:extLst>
+  </p:cSld>
+  <p:clrMapOvr>
+    <a:masterClrMapping/>
+  </p:clrMapOvr>
+</p:notes>
+</file>
+
+<file path=ppt/notesSlides/notesSlide8.xml><?xml version="1.0" encoding="utf-8"?>
+<p:notes xmlns:a="http://schemas.openxmlformats.org/drawingml/2006/main" xmlns:r="http://schemas.openxmlformats.org/officeDocument/2006/relationships" xmlns:p="http://schemas.openxmlformats.org/presentationml/2006/main">
+  <p:cSld>
+    <p:spTree>
+      <p:nvGrpSpPr>
+        <p:cNvPr id="1" name=""/>
+        <p:cNvGrpSpPr/>
+        <p:nvPr/>
+      </p:nvGrpSpPr>
+      <p:grpSpPr>
+        <a:xfrm>
+          <a:off x="0" y="0"/>
+          <a:ext cx="0" cy="0"/>
+          <a:chOff x="0" y="0"/>
+          <a:chExt cx="0" cy="0"/>
+        </a:xfrm>
+      </p:grpSpPr>
+      <p:sp>
+        <p:nvSpPr>
+          <p:cNvPr id="2" name="Slide Image Placeholder 1"/>
+          <p:cNvSpPr>
+            <a:spLocks noGrp="1" noRot="1" noChangeAspect="1"/>
+          </p:cNvSpPr>
+          <p:nvPr>
+            <p:ph type="sldImg"/>
+          </p:nvPr>
+        </p:nvSpPr>
+        <p:spPr/>
+      </p:sp>
+      <p:sp>
+        <p:nvSpPr>
+          <p:cNvPr id="3" name="Notes Placeholder 2"/>
+          <p:cNvSpPr>
+            <a:spLocks noGrp="1"/>
+          </p:cNvSpPr>
+          <p:nvPr>
+            <p:ph type="body" idx="1"/>
+          </p:nvPr>
+        </p:nvSpPr>
+        <p:spPr/>
+        <p:txBody>
+          <a:bodyPr/>
+          <a:lstStyle/>
+          <a:p>
+            <a:r>
+              <a:rPr lang="en-US" dirty="0"/>
+              <a:t>RNN</a:t>
+            </a:r>
+          </a:p>
+          <a:p>
+            <a:pPr marL="171450" indent="-171450">
+              <a:buFont typeface="Arial" panose="020B0604020202020204" pitchFamily="34" charset="0"/>
+              <a:buChar char="•"/>
+            </a:pPr>
+            <a:r>
+              <a:rPr lang="en-US" dirty="0" err="1"/>
+              <a:t>prev_input</a:t>
+            </a:r>
+            <a:r>
+              <a:rPr lang="en-US" dirty="0"/>
+              <a:t> </a:t>
+            </a:r>
+            <a:r>
+              <a:rPr lang="th-TH" dirty="0"/>
+              <a:t>จะนำมาเป็น </a:t>
+            </a:r>
+            <a:r>
+              <a:rPr lang="en-US" dirty="0"/>
+              <a:t>weight </a:t>
+            </a:r>
+            <a:r>
+              <a:rPr lang="th-TH" dirty="0"/>
+              <a:t>อีกเส้นนึงเพื่อบวกเพิ่ม (นอกเหนือจากที่คูณ</a:t>
+            </a:r>
+            <a:r>
+              <a:rPr lang="th-TH" baseline="0" dirty="0"/>
+              <a:t> </a:t>
+            </a:r>
+            <a:r>
+              <a:rPr lang="en-US" baseline="0" dirty="0"/>
+              <a:t>weight </a:t>
+            </a:r>
+            <a:r>
+              <a:rPr lang="th-TH" baseline="0" dirty="0"/>
+              <a:t>ปกติ</a:t>
+            </a:r>
+            <a:r>
+              <a:rPr lang="th-TH" dirty="0"/>
+              <a:t>)</a:t>
+            </a:r>
+          </a:p>
+          <a:p>
+            <a:pPr marL="171450" indent="-171450">
+              <a:buFont typeface="Arial" panose="020B0604020202020204" pitchFamily="34" charset="0"/>
+              <a:buChar char="•"/>
+            </a:pPr>
+            <a:r>
+              <a:rPr lang="th-TH" dirty="0"/>
+              <a:t>ปัญหา </a:t>
+            </a:r>
+            <a:r>
+              <a:rPr lang="en-US" dirty="0"/>
+              <a:t>vanishing</a:t>
+            </a:r>
+            <a:r>
+              <a:rPr lang="en-US" baseline="0" dirty="0"/>
+              <a:t> gradient </a:t>
+            </a:r>
+            <a:r>
+              <a:rPr lang="th-TH" baseline="0" dirty="0"/>
+              <a:t>ตัวอย่างเช่น ทายคำในประโยค </a:t>
+            </a:r>
+            <a:r>
+              <a:rPr lang="en-US" baseline="0" dirty="0"/>
+              <a:t>‘the glass is ___.’ </a:t>
+            </a:r>
+            <a:r>
+              <a:rPr lang="th-TH" baseline="0" dirty="0"/>
+              <a:t>ถ้าสั้นก็โอเค แต่ถ้ายาวจะเป็นปัญหา</a:t>
+            </a:r>
+            <a:endParaRPr lang="th-TH" dirty="0"/>
+          </a:p>
+          <a:p>
+            <a:pPr marL="0" indent="0">
+              <a:buFont typeface="Arial" panose="020B0604020202020204" pitchFamily="34" charset="0"/>
+              <a:buNone/>
+            </a:pPr>
+            <a:endParaRPr lang="en-US" dirty="0"/>
+          </a:p>
+          <a:p>
+            <a:pPr marL="0" indent="0">
+              <a:buFont typeface="Arial" panose="020B0604020202020204" pitchFamily="34" charset="0"/>
+              <a:buNone/>
+            </a:pPr>
+            <a:r>
+              <a:rPr lang="en-US" dirty="0"/>
+              <a:t>LSTM</a:t>
+            </a:r>
+          </a:p>
+          <a:p>
+            <a:pPr marL="171450" marR="0" lvl="0" indent="-171450" algn="l" defTabSz="914400" rtl="0" eaLnBrk="1" fontAlgn="auto" latinLnBrk="0" hangingPunct="1">
+              <a:lnSpc>
+                <a:spcPct val="100000"/>
+              </a:lnSpc>
+              <a:spcBef>
+                <a:spcPts val="0"/>
+              </a:spcBef>
+              <a:spcAft>
+                <a:spcPts val="0"/>
+              </a:spcAft>
+              <a:buClrTx/>
+              <a:buSzTx/>
+              <a:buFont typeface="Arial" panose="020B0604020202020204" pitchFamily="34" charset="0"/>
+              <a:buChar char="•"/>
+              <a:tabLst/>
+              <a:defRPr/>
+            </a:pPr>
+            <a:r>
+              <a:rPr lang="en-US" dirty="0"/>
+              <a:t>Gates (series of matrix operation)</a:t>
+            </a:r>
+          </a:p>
+          <a:p>
+            <a:pPr marL="628650" lvl="1" indent="-171450">
+              <a:buFont typeface="Arial" panose="020B0604020202020204" pitchFamily="34" charset="0"/>
+              <a:buChar char="•"/>
+            </a:pPr>
+            <a:r>
+              <a:rPr lang="en-US" dirty="0"/>
+              <a:t>Input</a:t>
+            </a:r>
+            <a:r>
+              <a:rPr lang="en-US" baseline="0" dirty="0"/>
+              <a:t> gate</a:t>
+            </a:r>
+          </a:p>
+          <a:p>
+            <a:pPr marL="628650" lvl="1" indent="-171450">
+              <a:buFont typeface="Arial" panose="020B0604020202020204" pitchFamily="34" charset="0"/>
+              <a:buChar char="•"/>
+            </a:pPr>
+            <a:r>
+              <a:rPr lang="en-US" baseline="0" dirty="0"/>
+              <a:t>Forget gate</a:t>
+            </a:r>
+          </a:p>
+          <a:p>
+            <a:pPr marL="628650" lvl="1" indent="-171450">
+              <a:buFont typeface="Arial" panose="020B0604020202020204" pitchFamily="34" charset="0"/>
+              <a:buChar char="•"/>
+            </a:pPr>
+            <a:r>
+              <a:rPr lang="en-US" baseline="0" dirty="0"/>
+              <a:t>Output gate</a:t>
+            </a:r>
+          </a:p>
+          <a:p>
+            <a:pPr marL="171450" lvl="0" indent="-171450">
+              <a:buFont typeface="Arial" panose="020B0604020202020204" pitchFamily="34" charset="0"/>
+              <a:buChar char="•"/>
+            </a:pPr>
+            <a:r>
+              <a:rPr lang="th-TH" baseline="0" dirty="0"/>
+              <a:t>อยากรู้ว่าจะ </a:t>
+            </a:r>
+            <a:r>
+              <a:rPr lang="en-US" baseline="0" dirty="0"/>
+              <a:t>learn input or forget </a:t>
+            </a:r>
+            <a:r>
+              <a:rPr lang="th-TH" baseline="0" dirty="0"/>
+              <a:t>ให้ดูจาก </a:t>
+            </a:r>
+            <a:r>
+              <a:rPr lang="en-US" baseline="0" dirty="0"/>
+              <a:t>Gradient Descent</a:t>
+            </a:r>
+            <a:endParaRPr lang="en-US" dirty="0"/>
+          </a:p>
+        </p:txBody>
+      </p:sp>
+      <p:sp>
+        <p:nvSpPr>
+          <p:cNvPr id="4" name="Slide Number Placeholder 3"/>
+          <p:cNvSpPr>
+            <a:spLocks noGrp="1"/>
+          </p:cNvSpPr>
+          <p:nvPr>
+            <p:ph type="sldNum" sz="quarter" idx="10"/>
+          </p:nvPr>
+        </p:nvSpPr>
+        <p:spPr/>
+        <p:txBody>
+          <a:bodyPr/>
+          <a:lstStyle/>
+          <a:p>
+            <a:fld id="{E6E59516-A3BF-4735-8DA9-18A21994B58E}" type="slidenum">
+              <a:rPr lang="en-US" smtClean="0"/>
+              <a:t>11</a:t>
+            </a:fld>
+            <a:endParaRPr lang="en-US"/>
+          </a:p>
+        </p:txBody>
+      </p:sp>
+    </p:spTree>
+    <p:extLst>
+      <p:ext uri="{BB962C8B-B14F-4D97-AF65-F5344CB8AC3E}">
+        <p14:creationId xmlns:p14="http://schemas.microsoft.com/office/powerpoint/2010/main" val="821290431"/>
+      </p:ext>
+    </p:extLst>
+  </p:cSld>
+  <p:clrMapOvr>
+    <a:masterClrMapping/>
+  </p:clrMapOvr>
+</p:notes>
 </file>
 
 <file path=ppt/slideLayouts/slideLayout1.xml><?xml version="1.0" encoding="utf-8"?>
@@ -3408,6 +6070,254 @@
 </p:sld>
 </file>
 
+<file path=ppt/slides/slide10.xml><?xml version="1.0" encoding="utf-8"?>
+<p:sld xmlns:a="http://schemas.openxmlformats.org/drawingml/2006/main" xmlns:r="http://schemas.openxmlformats.org/officeDocument/2006/relationships" xmlns:p="http://schemas.openxmlformats.org/presentationml/2006/main">
+  <p:cSld>
+    <p:spTree>
+      <p:nvGrpSpPr>
+        <p:cNvPr id="1" name=""/>
+        <p:cNvGrpSpPr/>
+        <p:nvPr/>
+      </p:nvGrpSpPr>
+      <p:grpSpPr>
+        <a:xfrm>
+          <a:off x="0" y="0"/>
+          <a:ext cx="0" cy="0"/>
+          <a:chOff x="0" y="0"/>
+          <a:chExt cx="0" cy="0"/>
+        </a:xfrm>
+      </p:grpSpPr>
+      <p:pic>
+        <p:nvPicPr>
+          <p:cNvPr id="3" name="Picture 2"/>
+          <p:cNvPicPr>
+            <a:picLocks noChangeAspect="1"/>
+          </p:cNvPicPr>
+          <p:nvPr/>
+        </p:nvPicPr>
+        <p:blipFill rotWithShape="1">
+          <a:blip r:embed="rId3">
+            <a:extLst>
+              <a:ext uri="{28A0092B-C50C-407E-A947-70E740481C1C}">
+                <a14:useLocalDpi xmlns:a14="http://schemas.microsoft.com/office/drawing/2010/main" val="0"/>
+              </a:ext>
+            </a:extLst>
+          </a:blip>
+          <a:srcRect b="1880"/>
+          <a:stretch/>
+        </p:blipFill>
+        <p:spPr>
+          <a:xfrm>
+            <a:off x="1981200" y="273903"/>
+            <a:ext cx="8229600" cy="6310195"/>
+          </a:xfrm>
+          <a:prstGeom prst="rect">
+            <a:avLst/>
+          </a:prstGeom>
+          <a:ln>
+            <a:solidFill>
+              <a:schemeClr val="tx1"/>
+            </a:solidFill>
+          </a:ln>
+        </p:spPr>
+      </p:pic>
+    </p:spTree>
+    <p:extLst>
+      <p:ext uri="{BB962C8B-B14F-4D97-AF65-F5344CB8AC3E}">
+        <p14:creationId xmlns:p14="http://schemas.microsoft.com/office/powerpoint/2010/main" val="3798167989"/>
+      </p:ext>
+    </p:extLst>
+  </p:cSld>
+  <p:clrMapOvr>
+    <a:masterClrMapping/>
+  </p:clrMapOvr>
+</p:sld>
+</file>
+
+<file path=ppt/slides/slide11.xml><?xml version="1.0" encoding="utf-8"?>
+<p:sld xmlns:a="http://schemas.openxmlformats.org/drawingml/2006/main" xmlns:r="http://schemas.openxmlformats.org/officeDocument/2006/relationships" xmlns:p="http://schemas.openxmlformats.org/presentationml/2006/main">
+  <p:cSld>
+    <p:spTree>
+      <p:nvGrpSpPr>
+        <p:cNvPr id="1" name=""/>
+        <p:cNvGrpSpPr/>
+        <p:nvPr/>
+      </p:nvGrpSpPr>
+      <p:grpSpPr>
+        <a:xfrm>
+          <a:off x="0" y="0"/>
+          <a:ext cx="0" cy="0"/>
+          <a:chOff x="0" y="0"/>
+          <a:chExt cx="0" cy="0"/>
+        </a:xfrm>
+      </p:grpSpPr>
+      <p:sp>
+        <p:nvSpPr>
+          <p:cNvPr id="2" name="Title 1">
+            <a:extLst>
+              <a:ext uri="{FF2B5EF4-FFF2-40B4-BE49-F238E27FC236}">
+                <a16:creationId xmlns:a16="http://schemas.microsoft.com/office/drawing/2014/main" id="{6E2C682D-FB6C-468F-B135-7DE8FEBC6B94}"/>
+              </a:ext>
+            </a:extLst>
+          </p:cNvPr>
+          <p:cNvSpPr>
+            <a:spLocks noGrp="1"/>
+          </p:cNvSpPr>
+          <p:nvPr>
+            <p:ph type="title"/>
+          </p:nvPr>
+        </p:nvSpPr>
+        <p:spPr>
+          <a:xfrm>
+            <a:off x="838200" y="365125"/>
+            <a:ext cx="10515600" cy="1325563"/>
+          </a:xfrm>
+        </p:spPr>
+        <p:txBody>
+          <a:bodyPr/>
+          <a:lstStyle/>
+          <a:p>
+            <a:r>
+              <a:rPr lang="en-US" b="1" dirty="0"/>
+              <a:t>Recurrent Neural Network &amp; LSTM</a:t>
+            </a:r>
+          </a:p>
+        </p:txBody>
+      </p:sp>
+      <p:sp>
+        <p:nvSpPr>
+          <p:cNvPr id="3" name="Content Placeholder 2">
+            <a:extLst>
+              <a:ext uri="{FF2B5EF4-FFF2-40B4-BE49-F238E27FC236}">
+                <a16:creationId xmlns:a16="http://schemas.microsoft.com/office/drawing/2014/main" id="{6C4A02BC-55E0-43EE-B02D-AA9CF77DFBE6}"/>
+              </a:ext>
+            </a:extLst>
+          </p:cNvPr>
+          <p:cNvSpPr>
+            <a:spLocks noGrp="1"/>
+          </p:cNvSpPr>
+          <p:nvPr>
+            <p:ph idx="1"/>
+          </p:nvPr>
+        </p:nvSpPr>
+        <p:spPr>
+          <a:xfrm>
+            <a:off x="838200" y="1825625"/>
+            <a:ext cx="10515600" cy="4351338"/>
+          </a:xfrm>
+        </p:spPr>
+        <p:txBody>
+          <a:bodyPr/>
+          <a:lstStyle/>
+          <a:p>
+            <a:pPr>
+              <a:lnSpc>
+                <a:spcPct val="130000"/>
+              </a:lnSpc>
+            </a:pPr>
+            <a:r>
+              <a:rPr lang="en-US" dirty="0"/>
+              <a:t>Recurrent Neural Network </a:t>
+            </a:r>
+            <a:r>
+              <a:rPr lang="th-TH" dirty="0"/>
+              <a:t>คือการทำ </a:t>
+            </a:r>
+            <a:r>
+              <a:rPr lang="en-US" dirty="0"/>
+              <a:t>Feedforward NN</a:t>
+            </a:r>
+            <a:r>
+              <a:rPr lang="th-TH" dirty="0"/>
+              <a:t> ที่นำ </a:t>
+            </a:r>
+            <a:r>
+              <a:rPr lang="en-US" dirty="0"/>
+              <a:t>output </a:t>
+            </a:r>
+            <a:r>
+              <a:rPr lang="th-TH" dirty="0"/>
+              <a:t>ของรอบที่แล้วมาเป็น </a:t>
+            </a:r>
+            <a:r>
+              <a:rPr lang="en-US" dirty="0"/>
+              <a:t>input </a:t>
+            </a:r>
+            <a:r>
+              <a:rPr lang="th-TH" dirty="0"/>
+              <a:t>ของรอบปัจจุบัน</a:t>
+            </a:r>
+            <a:endParaRPr lang="en-US" dirty="0"/>
+          </a:p>
+          <a:p>
+            <a:pPr>
+              <a:lnSpc>
+                <a:spcPct val="130000"/>
+              </a:lnSpc>
+            </a:pPr>
+            <a:r>
+              <a:rPr lang="en-US" dirty="0"/>
+              <a:t>(input + </a:t>
+            </a:r>
+            <a:r>
+              <a:rPr lang="en-US"/>
+              <a:t>previous_input</a:t>
+            </a:r>
+            <a:r>
+              <a:rPr lang="en-US" dirty="0"/>
+              <a:t>) -&gt; hidden -&gt; output</a:t>
+            </a:r>
+            <a:endParaRPr lang="th-TH" dirty="0"/>
+          </a:p>
+          <a:p>
+            <a:pPr>
+              <a:lnSpc>
+                <a:spcPct val="130000"/>
+              </a:lnSpc>
+            </a:pPr>
+            <a:r>
+              <a:rPr lang="en-US" dirty="0"/>
+              <a:t>Sequential, Time series</a:t>
+            </a:r>
+          </a:p>
+          <a:p>
+            <a:pPr>
+              <a:lnSpc>
+                <a:spcPct val="130000"/>
+              </a:lnSpc>
+            </a:pPr>
+            <a:r>
+              <a:rPr lang="th-TH" dirty="0"/>
+              <a:t>ปัญหา </a:t>
+            </a:r>
+            <a:r>
+              <a:rPr lang="en-US" dirty="0"/>
+              <a:t>Vanishing</a:t>
+            </a:r>
+            <a:r>
+              <a:rPr lang="th-TH" dirty="0"/>
+              <a:t> </a:t>
+            </a:r>
+            <a:r>
+              <a:rPr lang="en-US" dirty="0"/>
+              <a:t>Gradient -&gt; LSTM</a:t>
+            </a:r>
+          </a:p>
+        </p:txBody>
+      </p:sp>
+    </p:spTree>
+    <p:extLst>
+      <p:ext uri="{BB962C8B-B14F-4D97-AF65-F5344CB8AC3E}">
+        <p14:creationId xmlns:p14="http://schemas.microsoft.com/office/powerpoint/2010/main" val="2165961260"/>
+      </p:ext>
+    </p:extLst>
+  </p:cSld>
+  <p:clrMapOvr>
+    <a:masterClrMapping/>
+  </p:clrMapOvr>
+</p:sld>
+</file>
+
 <file path=ppt/slides/slide2.xml><?xml version="1.0" encoding="utf-8"?>
 <p:sld xmlns:a="http://schemas.openxmlformats.org/drawingml/2006/main" xmlns:r="http://schemas.openxmlformats.org/officeDocument/2006/relationships" xmlns:p="http://schemas.openxmlformats.org/presentationml/2006/main">
   <p:cSld>
@@ -3474,7 +6384,12 @@
             <p:ph idx="1"/>
           </p:nvPr>
         </p:nvSpPr>
-        <p:spPr/>
+        <p:spPr>
+          <a:xfrm>
+            <a:off x="838200" y="1825625"/>
+            <a:ext cx="10515600" cy="4351338"/>
+          </a:xfrm>
+        </p:spPr>
         <p:txBody>
           <a:bodyPr/>
           <a:lstStyle/>
@@ -3576,45 +6491,46 @@
           <a:p>
             <a:r>
               <a:rPr lang="en-US" b="1" dirty="0"/>
-              <a:t>Machine Learning</a:t>
-            </a:r>
-          </a:p>
-        </p:txBody>
-      </p:sp>
-      <p:sp>
-        <p:nvSpPr>
-          <p:cNvPr id="3" name="Content Placeholder 2">
-            <a:extLst>
-              <a:ext uri="{FF2B5EF4-FFF2-40B4-BE49-F238E27FC236}">
-                <a16:creationId xmlns:a16="http://schemas.microsoft.com/office/drawing/2014/main" id="{6C4A02BC-55E0-43EE-B02D-AA9CF77DFBE6}"/>
-              </a:ext>
-            </a:extLst>
-          </p:cNvPr>
-          <p:cNvSpPr>
-            <a:spLocks noGrp="1"/>
-          </p:cNvSpPr>
-          <p:nvPr>
-            <p:ph idx="1"/>
-          </p:nvPr>
-        </p:nvSpPr>
-        <p:spPr/>
-        <p:txBody>
-          <a:bodyPr/>
-          <a:lstStyle/>
-          <a:p>
-            <a:pPr>
-              <a:lnSpc>
-                <a:spcPct val="130000"/>
-              </a:lnSpc>
-            </a:pPr>
-            <a:endParaRPr lang="en-US" dirty="0"/>
-          </a:p>
-        </p:txBody>
-      </p:sp>
+              <a:t>Example – Predicting salary</a:t>
+            </a:r>
+          </a:p>
+        </p:txBody>
+      </p:sp>
+      <p:pic>
+        <p:nvPicPr>
+          <p:cNvPr id="5" name="Picture 4">
+            <a:extLst/>
+          </p:cNvPr>
+          <p:cNvPicPr>
+            <a:picLocks noChangeAspect="1"/>
+          </p:cNvPicPr>
+          <p:nvPr/>
+        </p:nvPicPr>
+        <p:blipFill>
+          <a:blip r:embed="rId3"/>
+          <a:stretch>
+            <a:fillRect/>
+          </a:stretch>
+        </p:blipFill>
+        <p:spPr>
+          <a:xfrm>
+            <a:off x="1752600" y="1606990"/>
+            <a:ext cx="8686800" cy="4978050"/>
+          </a:xfrm>
+          <a:prstGeom prst="rect">
+            <a:avLst/>
+          </a:prstGeom>
+          <a:ln>
+            <a:solidFill>
+              <a:schemeClr val="tx1"/>
+            </a:solidFill>
+          </a:ln>
+        </p:spPr>
+      </p:pic>
     </p:spTree>
     <p:extLst>
       <p:ext uri="{BB962C8B-B14F-4D97-AF65-F5344CB8AC3E}">
-        <p14:creationId xmlns:p14="http://schemas.microsoft.com/office/powerpoint/2010/main" val="4268837875"/>
+        <p14:creationId xmlns:p14="http://schemas.microsoft.com/office/powerpoint/2010/main" val="3403273694"/>
       </p:ext>
     </p:extLst>
   </p:cSld>
@@ -3641,73 +6557,82 @@
           <a:chExt cx="0" cy="0"/>
         </a:xfrm>
       </p:grpSpPr>
-      <p:sp>
-        <p:nvSpPr>
-          <p:cNvPr id="2" name="Title 1">
-            <a:extLst>
-              <a:ext uri="{FF2B5EF4-FFF2-40B4-BE49-F238E27FC236}">
-                <a16:creationId xmlns:a16="http://schemas.microsoft.com/office/drawing/2014/main" id="{6E2C682D-FB6C-468F-B135-7DE8FEBC6B94}"/>
-              </a:ext>
-            </a:extLst>
-          </p:cNvPr>
-          <p:cNvSpPr>
-            <a:spLocks noGrp="1"/>
-          </p:cNvSpPr>
-          <p:nvPr>
-            <p:ph type="title"/>
-          </p:nvPr>
-        </p:nvSpPr>
+      <p:pic>
+        <p:nvPicPr>
+          <p:cNvPr id="5" name="Picture 4">
+            <a:extLst>
+              <a:ext uri="{FF2B5EF4-FFF2-40B4-BE49-F238E27FC236}">
+                <a16:creationId xmlns:a16="http://schemas.microsoft.com/office/drawing/2014/main" id="{CC9FB896-44CB-47D2-93E8-95E9026B05AA}"/>
+              </a:ext>
+            </a:extLst>
+          </p:cNvPr>
+          <p:cNvPicPr>
+            <a:picLocks noChangeAspect="1"/>
+          </p:cNvPicPr>
+          <p:nvPr/>
+        </p:nvPicPr>
+        <p:blipFill>
+          <a:blip r:embed="rId2">
+            <a:extLst>
+              <a:ext uri="{28A0092B-C50C-407E-A947-70E740481C1C}">
+                <a14:useLocalDpi xmlns:a14="http://schemas.microsoft.com/office/drawing/2010/main" val="0"/>
+              </a:ext>
+            </a:extLst>
+          </a:blip>
+          <a:stretch>
+            <a:fillRect/>
+          </a:stretch>
+        </p:blipFill>
         <p:spPr>
           <a:xfrm>
-            <a:off x="838200" y="365125"/>
-            <a:ext cx="10515600" cy="1325563"/>
+            <a:off x="272960" y="1663298"/>
+            <a:ext cx="5220889" cy="3531405"/>
           </a:xfrm>
+          <a:prstGeom prst="rect">
+            <a:avLst/>
+          </a:prstGeom>
         </p:spPr>
-        <p:txBody>
-          <a:bodyPr/>
-          <a:lstStyle/>
-          <a:p>
-            <a:r>
-              <a:rPr lang="en-US" b="1" dirty="0"/>
-              <a:t>Feedforward Networks</a:t>
-            </a:r>
-          </a:p>
-        </p:txBody>
-      </p:sp>
-      <p:sp>
-        <p:nvSpPr>
-          <p:cNvPr id="3" name="Content Placeholder 2">
-            <a:extLst>
-              <a:ext uri="{FF2B5EF4-FFF2-40B4-BE49-F238E27FC236}">
-                <a16:creationId xmlns:a16="http://schemas.microsoft.com/office/drawing/2014/main" id="{6C4A02BC-55E0-43EE-B02D-AA9CF77DFBE6}"/>
-              </a:ext>
-            </a:extLst>
-          </p:cNvPr>
-          <p:cNvSpPr>
-            <a:spLocks noGrp="1"/>
-          </p:cNvSpPr>
-          <p:nvPr>
-            <p:ph idx="1"/>
-          </p:nvPr>
-        </p:nvSpPr>
-        <p:spPr/>
-        <p:txBody>
-          <a:bodyPr/>
-          <a:lstStyle/>
-          <a:p>
-            <a:pPr>
-              <a:lnSpc>
-                <a:spcPct val="130000"/>
-              </a:lnSpc>
-            </a:pPr>
-            <a:endParaRPr lang="en-US" dirty="0"/>
-          </a:p>
-        </p:txBody>
-      </p:sp>
+      </p:pic>
+      <p:pic>
+        <p:nvPicPr>
+          <p:cNvPr id="7" name="Picture 6">
+            <a:extLst>
+              <a:ext uri="{FF2B5EF4-FFF2-40B4-BE49-F238E27FC236}">
+                <a16:creationId xmlns:a16="http://schemas.microsoft.com/office/drawing/2014/main" id="{643FAF1D-737E-48F4-8BC2-F8B814BDE897}"/>
+              </a:ext>
+            </a:extLst>
+          </p:cNvPr>
+          <p:cNvPicPr>
+            <a:picLocks noChangeAspect="1"/>
+          </p:cNvPicPr>
+          <p:nvPr/>
+        </p:nvPicPr>
+        <p:blipFill>
+          <a:blip r:embed="rId3">
+            <a:extLst>
+              <a:ext uri="{28A0092B-C50C-407E-A947-70E740481C1C}">
+                <a14:useLocalDpi xmlns:a14="http://schemas.microsoft.com/office/drawing/2010/main" val="0"/>
+              </a:ext>
+            </a:extLst>
+          </a:blip>
+          <a:stretch>
+            <a:fillRect/>
+          </a:stretch>
+        </p:blipFill>
+        <p:spPr>
+          <a:xfrm>
+            <a:off x="6698151" y="1663298"/>
+            <a:ext cx="5220889" cy="3531405"/>
+          </a:xfrm>
+          <a:prstGeom prst="rect">
+            <a:avLst/>
+          </a:prstGeom>
+        </p:spPr>
+      </p:pic>
     </p:spTree>
     <p:extLst>
       <p:ext uri="{BB962C8B-B14F-4D97-AF65-F5344CB8AC3E}">
-        <p14:creationId xmlns:p14="http://schemas.microsoft.com/office/powerpoint/2010/main" val="1327243557"/>
+        <p14:creationId xmlns:p14="http://schemas.microsoft.com/office/powerpoint/2010/main" val="705134890"/>
       </p:ext>
     </p:extLst>
   </p:cSld>
@@ -3762,7 +6687,7 @@
           <a:p>
             <a:r>
               <a:rPr lang="en-US" b="1" dirty="0"/>
-              <a:t>Deep Learning</a:t>
+              <a:t>Artificial Neural Networks</a:t>
             </a:r>
           </a:p>
         </p:txBody>
@@ -3783,7 +6708,12 @@
             <p:ph idx="1"/>
           </p:nvPr>
         </p:nvSpPr>
-        <p:spPr/>
+        <p:spPr>
+          <a:xfrm>
+            <a:off x="838200" y="1825625"/>
+            <a:ext cx="10515600" cy="4351338"/>
+          </a:xfrm>
+        </p:spPr>
         <p:txBody>
           <a:bodyPr/>
           <a:lstStyle/>
@@ -3793,7 +6723,43 @@
                 <a:spcPct val="130000"/>
               </a:lnSpc>
             </a:pPr>
-            <a:endParaRPr lang="en-US" dirty="0"/>
+            <a:r>
+              <a:rPr lang="en-US" dirty="0"/>
+              <a:t>Feedforward Networks</a:t>
+            </a:r>
+          </a:p>
+          <a:p>
+            <a:pPr>
+              <a:lnSpc>
+                <a:spcPct val="130000"/>
+              </a:lnSpc>
+            </a:pPr>
+            <a:r>
+              <a:rPr lang="en-US" dirty="0"/>
+              <a:t>The Activation Function</a:t>
+            </a:r>
+          </a:p>
+          <a:p>
+            <a:pPr>
+              <a:lnSpc>
+                <a:spcPct val="130000"/>
+              </a:lnSpc>
+            </a:pPr>
+            <a:r>
+              <a:rPr lang="en-US" dirty="0"/>
+              <a:t>Normal &amp; Stochastic Gradient Descent</a:t>
+            </a:r>
+          </a:p>
+          <a:p>
+            <a:pPr>
+              <a:lnSpc>
+                <a:spcPct val="130000"/>
+              </a:lnSpc>
+            </a:pPr>
+            <a:r>
+              <a:rPr lang="en-US" dirty="0"/>
+              <a:t>Backpropagation</a:t>
+            </a:r>
           </a:p>
         </p:txBody>
       </p:sp>
@@ -3855,49 +6821,15 @@
           <a:p>
             <a:r>
               <a:rPr lang="en-US" b="1" dirty="0"/>
-              <a:t>Convolutional Neural Network</a:t>
-            </a:r>
-          </a:p>
-        </p:txBody>
-      </p:sp>
-      <p:sp>
-        <p:nvSpPr>
-          <p:cNvPr id="3" name="Content Placeholder 2">
-            <a:extLst>
-              <a:ext uri="{FF2B5EF4-FFF2-40B4-BE49-F238E27FC236}">
-                <a16:creationId xmlns:a16="http://schemas.microsoft.com/office/drawing/2014/main" id="{6C4A02BC-55E0-43EE-B02D-AA9CF77DFBE6}"/>
-              </a:ext>
-            </a:extLst>
-          </p:cNvPr>
-          <p:cNvSpPr>
-            <a:spLocks noGrp="1"/>
-          </p:cNvSpPr>
-          <p:nvPr>
-            <p:ph idx="1"/>
-          </p:nvPr>
-        </p:nvSpPr>
-        <p:spPr/>
-        <p:txBody>
-          <a:bodyPr/>
-          <a:lstStyle/>
-          <a:p>
-            <a:pPr>
-              <a:lnSpc>
-                <a:spcPct val="130000"/>
-              </a:lnSpc>
-            </a:pPr>
-            <a:endParaRPr lang="en-US" dirty="0"/>
+              <a:t>Example – Customer’s Bank</a:t>
+            </a:r>
           </a:p>
         </p:txBody>
       </p:sp>
       <p:pic>
         <p:nvPicPr>
-          <p:cNvPr id="4" name="Picture 3">
-            <a:extLst>
-              <a:ext uri="{FF2B5EF4-FFF2-40B4-BE49-F238E27FC236}">
-                <a16:creationId xmlns:a16="http://schemas.microsoft.com/office/drawing/2014/main" id="{3AE45C41-CC2B-4FEE-BE1D-2E6B283B8034}"/>
-              </a:ext>
-            </a:extLst>
+          <p:cNvPr id="5" name="Picture 4">
+            <a:extLst/>
           </p:cNvPr>
           <p:cNvPicPr>
             <a:picLocks noChangeAspect="1"/>
@@ -3905,31 +6837,30 @@
           <p:nvPr/>
         </p:nvPicPr>
         <p:blipFill>
-          <a:blip r:embed="rId2">
-            <a:extLst>
-              <a:ext uri="{28A0092B-C50C-407E-A947-70E740481C1C}">
-                <a14:useLocalDpi xmlns:a14="http://schemas.microsoft.com/office/drawing/2010/main" val="0"/>
-              </a:ext>
-            </a:extLst>
-          </a:blip>
+          <a:blip r:embed="rId2"/>
           <a:stretch>
             <a:fillRect/>
           </a:stretch>
         </p:blipFill>
         <p:spPr>
           <a:xfrm>
-            <a:off x="6705600" y="5004427"/>
-            <a:ext cx="5486400" cy="1853573"/>
+            <a:off x="1524000" y="1931985"/>
+            <a:ext cx="9144000" cy="4311855"/>
           </a:xfrm>
           <a:prstGeom prst="rect">
             <a:avLst/>
           </a:prstGeom>
+          <a:ln>
+            <a:solidFill>
+              <a:schemeClr val="tx1"/>
+            </a:solidFill>
+          </a:ln>
         </p:spPr>
       </p:pic>
     </p:spTree>
     <p:extLst>
       <p:ext uri="{BB962C8B-B14F-4D97-AF65-F5344CB8AC3E}">
-        <p14:creationId xmlns:p14="http://schemas.microsoft.com/office/powerpoint/2010/main" val="2069804669"/>
+        <p14:creationId xmlns:p14="http://schemas.microsoft.com/office/powerpoint/2010/main" val="1410893194"/>
       </p:ext>
     </p:extLst>
   </p:cSld>
@@ -3984,7 +6915,7 @@
           <a:p>
             <a:r>
               <a:rPr lang="en-US" b="1" dirty="0"/>
-              <a:t>Recurrent Networks &amp; LSTM</a:t>
+              <a:t>Example – Customer’s Bank</a:t>
             </a:r>
           </a:p>
         </p:txBody>
@@ -4005,7 +6936,12 @@
             <p:ph idx="1"/>
           </p:nvPr>
         </p:nvSpPr>
-        <p:spPr/>
+        <p:spPr>
+          <a:xfrm>
+            <a:off x="838200" y="1825625"/>
+            <a:ext cx="10515600" cy="4351338"/>
+          </a:xfrm>
+        </p:spPr>
         <p:txBody>
           <a:bodyPr/>
           <a:lstStyle/>
@@ -4015,14 +6951,416 @@
                 <a:spcPct val="130000"/>
               </a:lnSpc>
             </a:pPr>
-            <a:endParaRPr lang="en-US" dirty="0"/>
+            <a:r>
+              <a:rPr lang="en-US" dirty="0"/>
+              <a:t>Input Layer has 11 nodes</a:t>
+            </a:r>
+          </a:p>
+          <a:p>
+            <a:pPr>
+              <a:lnSpc>
+                <a:spcPct val="130000"/>
+              </a:lnSpc>
+            </a:pPr>
+            <a:r>
+              <a:rPr lang="en-US" dirty="0"/>
+              <a:t>2 Hidden Layer, each layer has 6 nodes</a:t>
+            </a:r>
+          </a:p>
+          <a:p>
+            <a:pPr>
+              <a:lnSpc>
+                <a:spcPct val="130000"/>
+              </a:lnSpc>
+            </a:pPr>
+            <a:r>
+              <a:rPr lang="en-US" dirty="0"/>
+              <a:t>Output Layer</a:t>
+            </a:r>
           </a:p>
         </p:txBody>
       </p:sp>
     </p:spTree>
     <p:extLst>
       <p:ext uri="{BB962C8B-B14F-4D97-AF65-F5344CB8AC3E}">
-        <p14:creationId xmlns:p14="http://schemas.microsoft.com/office/powerpoint/2010/main" val="2165961260"/>
+        <p14:creationId xmlns:p14="http://schemas.microsoft.com/office/powerpoint/2010/main" val="1647687013"/>
+      </p:ext>
+    </p:extLst>
+  </p:cSld>
+  <p:clrMapOvr>
+    <a:masterClrMapping/>
+  </p:clrMapOvr>
+</p:sld>
+</file>
+
+<file path=ppt/slides/slide8.xml><?xml version="1.0" encoding="utf-8"?>
+<p:sld xmlns:a="http://schemas.openxmlformats.org/drawingml/2006/main" xmlns:r="http://schemas.openxmlformats.org/officeDocument/2006/relationships" xmlns:p="http://schemas.openxmlformats.org/presentationml/2006/main">
+  <p:cSld>
+    <p:spTree>
+      <p:nvGrpSpPr>
+        <p:cNvPr id="1" name=""/>
+        <p:cNvGrpSpPr/>
+        <p:nvPr/>
+      </p:nvGrpSpPr>
+      <p:grpSpPr>
+        <a:xfrm>
+          <a:off x="0" y="0"/>
+          <a:ext cx="0" cy="0"/>
+          <a:chOff x="0" y="0"/>
+          <a:chExt cx="0" cy="0"/>
+        </a:xfrm>
+      </p:grpSpPr>
+      <p:pic>
+        <p:nvPicPr>
+          <p:cNvPr id="7" name="Picture 6">
+            <a:extLst>
+              <a:ext uri="{FF2B5EF4-FFF2-40B4-BE49-F238E27FC236}">
+                <a16:creationId xmlns:a16="http://schemas.microsoft.com/office/drawing/2014/main" id="{390C7338-44EE-4CEF-8547-6AAF9C3FB6E0}"/>
+              </a:ext>
+            </a:extLst>
+          </p:cNvPr>
+          <p:cNvPicPr>
+            <a:picLocks noChangeAspect="1"/>
+          </p:cNvPicPr>
+          <p:nvPr/>
+        </p:nvPicPr>
+        <p:blipFill>
+          <a:blip r:embed="rId3"/>
+          <a:stretch>
+            <a:fillRect/>
+          </a:stretch>
+        </p:blipFill>
+        <p:spPr>
+          <a:xfrm>
+            <a:off x="274320" y="274320"/>
+            <a:ext cx="8229600" cy="4947082"/>
+          </a:xfrm>
+          <a:prstGeom prst="rect">
+            <a:avLst/>
+          </a:prstGeom>
+          <a:ln>
+            <a:solidFill>
+              <a:schemeClr val="tx1"/>
+            </a:solidFill>
+          </a:ln>
+        </p:spPr>
+      </p:pic>
+      <p:pic>
+        <p:nvPicPr>
+          <p:cNvPr id="2" name="Picture 1">
+            <a:extLst>
+              <a:ext uri="{FF2B5EF4-FFF2-40B4-BE49-F238E27FC236}">
+                <a16:creationId xmlns:a16="http://schemas.microsoft.com/office/drawing/2014/main" id="{2E69A80C-33A1-4A0F-ABD1-CA8E772A0E11}"/>
+              </a:ext>
+            </a:extLst>
+          </p:cNvPr>
+          <p:cNvPicPr>
+            <a:picLocks noChangeAspect="1"/>
+          </p:cNvPicPr>
+          <p:nvPr/>
+        </p:nvPicPr>
+        <p:blipFill rotWithShape="1">
+          <a:blip r:embed="rId4"/>
+          <a:srcRect r="15771"/>
+          <a:stretch/>
+        </p:blipFill>
+        <p:spPr>
+          <a:xfrm>
+            <a:off x="5987804" y="3308440"/>
+            <a:ext cx="5944884" cy="3276600"/>
+          </a:xfrm>
+          <a:prstGeom prst="rect">
+            <a:avLst/>
+          </a:prstGeom>
+          <a:ln>
+            <a:solidFill>
+              <a:schemeClr val="tx1"/>
+            </a:solidFill>
+          </a:ln>
+        </p:spPr>
+      </p:pic>
+    </p:spTree>
+    <p:extLst>
+      <p:ext uri="{BB962C8B-B14F-4D97-AF65-F5344CB8AC3E}">
+        <p14:creationId xmlns:p14="http://schemas.microsoft.com/office/powerpoint/2010/main" val="1791583215"/>
+      </p:ext>
+    </p:extLst>
+  </p:cSld>
+  <p:clrMapOvr>
+    <a:masterClrMapping/>
+  </p:clrMapOvr>
+  <p:timing>
+    <p:tnLst>
+      <p:par>
+        <p:cTn id="1" dur="indefinite" restart="never" nodeType="tmRoot">
+          <p:childTnLst>
+            <p:seq concurrent="1" nextAc="seek">
+              <p:cTn id="2" dur="indefinite" nodeType="mainSeq">
+                <p:childTnLst>
+                  <p:par>
+                    <p:cTn id="3" fill="hold">
+                      <p:stCondLst>
+                        <p:cond delay="indefinite"/>
+                      </p:stCondLst>
+                      <p:childTnLst>
+                        <p:par>
+                          <p:cTn id="4" fill="hold">
+                            <p:stCondLst>
+                              <p:cond delay="0"/>
+                            </p:stCondLst>
+                            <p:childTnLst>
+                              <p:par>
+                                <p:cTn id="5" presetID="1" presetClass="entr" presetSubtype="0" fill="hold" nodeType="clickEffect">
+                                  <p:stCondLst>
+                                    <p:cond delay="0"/>
+                                  </p:stCondLst>
+                                  <p:childTnLst>
+                                    <p:set>
+                                      <p:cBhvr>
+                                        <p:cTn id="6" dur="1" fill="hold">
+                                          <p:stCondLst>
+                                            <p:cond delay="0"/>
+                                          </p:stCondLst>
+                                        </p:cTn>
+                                        <p:tgtEl>
+                                          <p:spTgt spid="2"/>
+                                        </p:tgtEl>
+                                        <p:attrNameLst>
+                                          <p:attrName>style.visibility</p:attrName>
+                                        </p:attrNameLst>
+                                      </p:cBhvr>
+                                      <p:to>
+                                        <p:strVal val="visible"/>
+                                      </p:to>
+                                    </p:set>
+                                  </p:childTnLst>
+                                </p:cTn>
+                              </p:par>
+                            </p:childTnLst>
+                          </p:cTn>
+                        </p:par>
+                      </p:childTnLst>
+                    </p:cTn>
+                  </p:par>
+                </p:childTnLst>
+              </p:cTn>
+              <p:prevCondLst>
+                <p:cond evt="onPrev" delay="0">
+                  <p:tgtEl>
+                    <p:sldTgt/>
+                  </p:tgtEl>
+                </p:cond>
+              </p:prevCondLst>
+              <p:nextCondLst>
+                <p:cond evt="onNext" delay="0">
+                  <p:tgtEl>
+                    <p:sldTgt/>
+                  </p:tgtEl>
+                </p:cond>
+              </p:nextCondLst>
+            </p:seq>
+          </p:childTnLst>
+        </p:cTn>
+      </p:par>
+    </p:tnLst>
+  </p:timing>
+</p:sld>
+</file>
+
+<file path=ppt/slides/slide9.xml><?xml version="1.0" encoding="utf-8"?>
+<p:sld xmlns:a="http://schemas.openxmlformats.org/drawingml/2006/main" xmlns:r="http://schemas.openxmlformats.org/officeDocument/2006/relationships" xmlns:p="http://schemas.openxmlformats.org/presentationml/2006/main">
+  <p:cSld>
+    <p:spTree>
+      <p:nvGrpSpPr>
+        <p:cNvPr id="1" name=""/>
+        <p:cNvGrpSpPr/>
+        <p:nvPr/>
+      </p:nvGrpSpPr>
+      <p:grpSpPr>
+        <a:xfrm>
+          <a:off x="0" y="0"/>
+          <a:ext cx="0" cy="0"/>
+          <a:chOff x="0" y="0"/>
+          <a:chExt cx="0" cy="0"/>
+        </a:xfrm>
+      </p:grpSpPr>
+      <p:sp>
+        <p:nvSpPr>
+          <p:cNvPr id="2" name="Title 1">
+            <a:extLst>
+              <a:ext uri="{FF2B5EF4-FFF2-40B4-BE49-F238E27FC236}">
+                <a16:creationId xmlns:a16="http://schemas.microsoft.com/office/drawing/2014/main" id="{6E2C682D-FB6C-468F-B135-7DE8FEBC6B94}"/>
+              </a:ext>
+            </a:extLst>
+          </p:cNvPr>
+          <p:cNvSpPr>
+            <a:spLocks noGrp="1"/>
+          </p:cNvSpPr>
+          <p:nvPr>
+            <p:ph type="title"/>
+          </p:nvPr>
+        </p:nvSpPr>
+        <p:spPr>
+          <a:xfrm>
+            <a:off x="838200" y="365125"/>
+            <a:ext cx="10515600" cy="1325563"/>
+          </a:xfrm>
+        </p:spPr>
+        <p:txBody>
+          <a:bodyPr/>
+          <a:lstStyle/>
+          <a:p>
+            <a:r>
+              <a:rPr lang="en-US" b="1" dirty="0"/>
+              <a:t>Convolutional Neural Network</a:t>
+            </a:r>
+          </a:p>
+        </p:txBody>
+      </p:sp>
+      <p:sp>
+        <p:nvSpPr>
+          <p:cNvPr id="3" name="Content Placeholder 2">
+            <a:extLst>
+              <a:ext uri="{FF2B5EF4-FFF2-40B4-BE49-F238E27FC236}">
+                <a16:creationId xmlns:a16="http://schemas.microsoft.com/office/drawing/2014/main" id="{6C4A02BC-55E0-43EE-B02D-AA9CF77DFBE6}"/>
+              </a:ext>
+            </a:extLst>
+          </p:cNvPr>
+          <p:cNvSpPr>
+            <a:spLocks noGrp="1"/>
+          </p:cNvSpPr>
+          <p:nvPr>
+            <p:ph idx="1"/>
+          </p:nvPr>
+        </p:nvSpPr>
+        <p:spPr/>
+        <p:txBody>
+          <a:bodyPr/>
+          <a:lstStyle/>
+          <a:p>
+            <a:pPr>
+              <a:lnSpc>
+                <a:spcPct val="130000"/>
+              </a:lnSpc>
+            </a:pPr>
+            <a:r>
+              <a:rPr lang="th-TH" dirty="0"/>
+              <a:t>เป็น </a:t>
+            </a:r>
+            <a:r>
+              <a:rPr lang="en-US" dirty="0"/>
+              <a:t>Supervised Learning</a:t>
+            </a:r>
+          </a:p>
+          <a:p>
+            <a:pPr>
+              <a:lnSpc>
+                <a:spcPct val="130000"/>
+              </a:lnSpc>
+            </a:pPr>
+            <a:r>
+              <a:rPr lang="en-US" dirty="0"/>
+              <a:t>Convolution Operation &amp; </a:t>
+            </a:r>
+            <a:r>
+              <a:rPr lang="en-US" dirty="0" err="1"/>
+              <a:t>ReLU</a:t>
+            </a:r>
+            <a:r>
+              <a:rPr lang="en-US" dirty="0"/>
+              <a:t> Layer</a:t>
+            </a:r>
+          </a:p>
+          <a:p>
+            <a:pPr>
+              <a:lnSpc>
+                <a:spcPct val="130000"/>
+              </a:lnSpc>
+            </a:pPr>
+            <a:r>
+              <a:rPr lang="en-US" dirty="0"/>
+              <a:t>Pooling</a:t>
+            </a:r>
+          </a:p>
+          <a:p>
+            <a:pPr>
+              <a:lnSpc>
+                <a:spcPct val="130000"/>
+              </a:lnSpc>
+            </a:pPr>
+            <a:r>
+              <a:rPr lang="en-US" dirty="0"/>
+              <a:t>Flattening</a:t>
+            </a:r>
+          </a:p>
+          <a:p>
+            <a:pPr>
+              <a:lnSpc>
+                <a:spcPct val="130000"/>
+              </a:lnSpc>
+            </a:pPr>
+            <a:r>
+              <a:rPr lang="en-US" dirty="0"/>
+              <a:t>Full Connection</a:t>
+            </a:r>
+          </a:p>
+          <a:p>
+            <a:pPr>
+              <a:lnSpc>
+                <a:spcPct val="130000"/>
+              </a:lnSpc>
+            </a:pPr>
+            <a:r>
+              <a:rPr lang="en-US" dirty="0" err="1"/>
+              <a:t>Softmax</a:t>
+            </a:r>
+            <a:r>
+              <a:rPr lang="en-US" dirty="0"/>
+              <a:t> &amp; Cross-Entropy</a:t>
+            </a:r>
+          </a:p>
+        </p:txBody>
+      </p:sp>
+      <p:pic>
+        <p:nvPicPr>
+          <p:cNvPr id="4" name="Picture 3">
+            <a:extLst>
+              <a:ext uri="{FF2B5EF4-FFF2-40B4-BE49-F238E27FC236}">
+                <a16:creationId xmlns:a16="http://schemas.microsoft.com/office/drawing/2014/main" id="{3AE45C41-CC2B-4FEE-BE1D-2E6B283B8034}"/>
+              </a:ext>
+            </a:extLst>
+          </p:cNvPr>
+          <p:cNvPicPr>
+            <a:picLocks noChangeAspect="1"/>
+          </p:cNvPicPr>
+          <p:nvPr/>
+        </p:nvPicPr>
+        <p:blipFill>
+          <a:blip r:embed="rId3">
+            <a:extLst>
+              <a:ext uri="{28A0092B-C50C-407E-A947-70E740481C1C}">
+                <a14:useLocalDpi xmlns:a14="http://schemas.microsoft.com/office/drawing/2010/main" val="0"/>
+              </a:ext>
+            </a:extLst>
+          </a:blip>
+          <a:stretch>
+            <a:fillRect/>
+          </a:stretch>
+        </p:blipFill>
+        <p:spPr>
+          <a:xfrm>
+            <a:off x="5129280" y="3859997"/>
+            <a:ext cx="6858000" cy="2316966"/>
+          </a:xfrm>
+          <a:prstGeom prst="rect">
+            <a:avLst/>
+          </a:prstGeom>
+        </p:spPr>
+      </p:pic>
+    </p:spTree>
+    <p:extLst>
+      <p:ext uri="{BB962C8B-B14F-4D97-AF65-F5344CB8AC3E}">
+        <p14:creationId xmlns:p14="http://schemas.microsoft.com/office/powerpoint/2010/main" val="2069804669"/>
       </p:ext>
     </p:extLst>
   </p:cSld>
@@ -4325,4 +7663,299 @@
     </a:ext>
   </a:extLst>
 </a:theme>
+</file>
+
+<file path=ppt/theme/theme2.xml><?xml version="1.0" encoding="utf-8"?>
+<a:theme xmlns:a="http://schemas.openxmlformats.org/drawingml/2006/main" name="Office Theme">
+  <a:themeElements>
+    <a:clrScheme name="Office">
+      <a:dk1>
+        <a:sysClr val="windowText" lastClr="000000"/>
+      </a:dk1>
+      <a:lt1>
+        <a:sysClr val="window" lastClr="FFFFFF"/>
+      </a:lt1>
+      <a:dk2>
+        <a:srgbClr val="44546A"/>
+      </a:dk2>
+      <a:lt2>
+        <a:srgbClr val="E7E6E6"/>
+      </a:lt2>
+      <a:accent1>
+        <a:srgbClr val="4472C4"/>
+      </a:accent1>
+      <a:accent2>
+        <a:srgbClr val="ED7D31"/>
+      </a:accent2>
+      <a:accent3>
+        <a:srgbClr val="A5A5A5"/>
+      </a:accent3>
+      <a:accent4>
+        <a:srgbClr val="FFC000"/>
+      </a:accent4>
+      <a:accent5>
+        <a:srgbClr val="5B9BD5"/>
+      </a:accent5>
+      <a:accent6>
+        <a:srgbClr val="70AD47"/>
+      </a:accent6>
+      <a:hlink>
+        <a:srgbClr val="0563C1"/>
+      </a:hlink>
+      <a:folHlink>
+        <a:srgbClr val="954F72"/>
+      </a:folHlink>
+    </a:clrScheme>
+    <a:fontScheme name="Office">
+      <a:majorFont>
+        <a:latin typeface="Calibri Light" panose="020F0302020204030204"/>
+        <a:ea typeface=""/>
+        <a:cs typeface=""/>
+        <a:font script="Jpan" typeface="游ゴシック Light"/>
+        <a:font script="Hang" typeface="맑은 고딕"/>
+        <a:font script="Hans" typeface="等线 Light"/>
+        <a:font script="Hant" typeface="新細明體"/>
+        <a:font script="Arab" typeface="Times New Roman"/>
+        <a:font script="Hebr" typeface="Times New Roman"/>
+        <a:font script="Thai" typeface="Angsana New"/>
+        <a:font script="Ethi" typeface="Nyala"/>
+        <a:font script="Beng" typeface="Vrinda"/>
+        <a:font script="Gujr" typeface="Shruti"/>
+        <a:font script="Khmr" typeface="MoolBoran"/>
+        <a:font script="Knda" typeface="Tunga"/>
+        <a:font script="Guru" typeface="Raavi"/>
+        <a:font script="Cans" typeface="Euphemia"/>
+        <a:font script="Cher" typeface="Plantagenet Cherokee"/>
+        <a:font script="Yiii" typeface="Microsoft Yi Baiti"/>
+        <a:font script="Tibt" typeface="Microsoft Himalaya"/>
+        <a:font script="Thaa" typeface="MV Boli"/>
+        <a:font script="Deva" typeface="Mangal"/>
+        <a:font script="Telu" typeface="Gautami"/>
+        <a:font script="Taml" typeface="Latha"/>
+        <a:font script="Syrc" typeface="Estrangelo Edessa"/>
+        <a:font script="Orya" typeface="Kalinga"/>
+        <a:font script="Mlym" typeface="Kartika"/>
+        <a:font script="Laoo" typeface="DokChampa"/>
+        <a:font script="Sinh" typeface="Iskoola Pota"/>
+        <a:font script="Mong" typeface="Mongolian Baiti"/>
+        <a:font script="Viet" typeface="Times New Roman"/>
+        <a:font script="Uigh" typeface="Microsoft Uighur"/>
+        <a:font script="Geor" typeface="Sylfaen"/>
+        <a:font script="Armn" typeface="Arial"/>
+        <a:font script="Bugi" typeface="Leelawadee UI"/>
+        <a:font script="Bopo" typeface="Microsoft JhengHei"/>
+        <a:font script="Java" typeface="Javanese Text"/>
+        <a:font script="Lisu" typeface="Segoe UI"/>
+        <a:font script="Mymr" typeface="Myanmar Text"/>
+        <a:font script="Nkoo" typeface="Ebrima"/>
+        <a:font script="Olck" typeface="Nirmala UI"/>
+        <a:font script="Osma" typeface="Ebrima"/>
+        <a:font script="Phag" typeface="Phagspa"/>
+        <a:font script="Syrn" typeface="Estrangelo Edessa"/>
+        <a:font script="Syrj" typeface="Estrangelo Edessa"/>
+        <a:font script="Syre" typeface="Estrangelo Edessa"/>
+        <a:font script="Sora" typeface="Nirmala UI"/>
+        <a:font script="Tale" typeface="Microsoft Tai Le"/>
+        <a:font script="Talu" typeface="Microsoft New Tai Lue"/>
+        <a:font script="Tfng" typeface="Ebrima"/>
+      </a:majorFont>
+      <a:minorFont>
+        <a:latin typeface="Calibri" panose="020F0502020204030204"/>
+        <a:ea typeface=""/>
+        <a:cs typeface=""/>
+        <a:font script="Jpan" typeface="游ゴシック"/>
+        <a:font script="Hang" typeface="맑은 고딕"/>
+        <a:font script="Hans" typeface="等线"/>
+        <a:font script="Hant" typeface="新細明體"/>
+        <a:font script="Arab" typeface="Arial"/>
+        <a:font script="Hebr" typeface="Arial"/>
+        <a:font script="Thai" typeface="Cordia New"/>
+        <a:font script="Ethi" typeface="Nyala"/>
+        <a:font script="Beng" typeface="Vrinda"/>
+        <a:font script="Gujr" typeface="Shruti"/>
+        <a:font script="Khmr" typeface="DaunPenh"/>
+        <a:font script="Knda" typeface="Tunga"/>
+        <a:font script="Guru" typeface="Raavi"/>
+        <a:font script="Cans" typeface="Euphemia"/>
+        <a:font script="Cher" typeface="Plantagenet Cherokee"/>
+        <a:font script="Yiii" typeface="Microsoft Yi Baiti"/>
+        <a:font script="Tibt" typeface="Microsoft Himalaya"/>
+        <a:font script="Thaa" typeface="MV Boli"/>
+        <a:font script="Deva" typeface="Mangal"/>
+        <a:font script="Telu" typeface="Gautami"/>
+        <a:font script="Taml" typeface="Latha"/>
+        <a:font script="Syrc" typeface="Estrangelo Edessa"/>
+        <a:font script="Orya" typeface="Kalinga"/>
+        <a:font script="Mlym" typeface="Kartika"/>
+        <a:font script="Laoo" typeface="DokChampa"/>
+        <a:font script="Sinh" typeface="Iskoola Pota"/>
+        <a:font script="Mong" typeface="Mongolian Baiti"/>
+        <a:font script="Viet" typeface="Arial"/>
+        <a:font script="Uigh" typeface="Microsoft Uighur"/>
+        <a:font script="Geor" typeface="Sylfaen"/>
+        <a:font script="Armn" typeface="Arial"/>
+        <a:font script="Bugi" typeface="Leelawadee UI"/>
+        <a:font script="Bopo" typeface="Microsoft JhengHei"/>
+        <a:font script="Java" typeface="Javanese Text"/>
+        <a:font script="Lisu" typeface="Segoe UI"/>
+        <a:font script="Mymr" typeface="Myanmar Text"/>
+        <a:font script="Nkoo" typeface="Ebrima"/>
+        <a:font script="Olck" typeface="Nirmala UI"/>
+        <a:font script="Osma" typeface="Ebrima"/>
+        <a:font script="Phag" typeface="Phagspa"/>
+        <a:font script="Syrn" typeface="Estrangelo Edessa"/>
+        <a:font script="Syrj" typeface="Estrangelo Edessa"/>
+        <a:font script="Syre" typeface="Estrangelo Edessa"/>
+        <a:font script="Sora" typeface="Nirmala UI"/>
+        <a:font script="Tale" typeface="Microsoft Tai Le"/>
+        <a:font script="Talu" typeface="Microsoft New Tai Lue"/>
+        <a:font script="Tfng" typeface="Ebrima"/>
+      </a:minorFont>
+    </a:fontScheme>
+    <a:fmtScheme name="Office">
+      <a:fillStyleLst>
+        <a:solidFill>
+          <a:schemeClr val="phClr"/>
+        </a:solidFill>
+        <a:gradFill rotWithShape="1">
+          <a:gsLst>
+            <a:gs pos="0">
+              <a:schemeClr val="phClr">
+                <a:lumMod val="110000"/>
+                <a:satMod val="105000"/>
+                <a:tint val="67000"/>
+              </a:schemeClr>
+            </a:gs>
+            <a:gs pos="50000">
+              <a:schemeClr val="phClr">
+                <a:lumMod val="105000"/>
+                <a:satMod val="103000"/>
+                <a:tint val="73000"/>
+              </a:schemeClr>
+            </a:gs>
+            <a:gs pos="100000">
+              <a:schemeClr val="phClr">
+                <a:lumMod val="105000"/>
+                <a:satMod val="109000"/>
+                <a:tint val="81000"/>
+              </a:schemeClr>
+            </a:gs>
+          </a:gsLst>
+          <a:lin ang="5400000" scaled="0"/>
+        </a:gradFill>
+        <a:gradFill rotWithShape="1">
+          <a:gsLst>
+            <a:gs pos="0">
+              <a:schemeClr val="phClr">
+                <a:satMod val="103000"/>
+                <a:lumMod val="102000"/>
+                <a:tint val="94000"/>
+              </a:schemeClr>
+            </a:gs>
+            <a:gs pos="50000">
+              <a:schemeClr val="phClr">
+                <a:satMod val="110000"/>
+                <a:lumMod val="100000"/>
+                <a:shade val="100000"/>
+              </a:schemeClr>
+            </a:gs>
+            <a:gs pos="100000">
+              <a:schemeClr val="phClr">
+                <a:lumMod val="99000"/>
+                <a:satMod val="120000"/>
+                <a:shade val="78000"/>
+              </a:schemeClr>
+            </a:gs>
+          </a:gsLst>
+          <a:lin ang="5400000" scaled="0"/>
+        </a:gradFill>
+      </a:fillStyleLst>
+      <a:lnStyleLst>
+        <a:ln w="6350" cap="flat" cmpd="sng" algn="ctr">
+          <a:solidFill>
+            <a:schemeClr val="phClr"/>
+          </a:solidFill>
+          <a:prstDash val="solid"/>
+          <a:miter lim="800000"/>
+        </a:ln>
+        <a:ln w="12700" cap="flat" cmpd="sng" algn="ctr">
+          <a:solidFill>
+            <a:schemeClr val="phClr"/>
+          </a:solidFill>
+          <a:prstDash val="solid"/>
+          <a:miter lim="800000"/>
+        </a:ln>
+        <a:ln w="19050" cap="flat" cmpd="sng" algn="ctr">
+          <a:solidFill>
+            <a:schemeClr val="phClr"/>
+          </a:solidFill>
+          <a:prstDash val="solid"/>
+          <a:miter lim="800000"/>
+        </a:ln>
+      </a:lnStyleLst>
+      <a:effectStyleLst>
+        <a:effectStyle>
+          <a:effectLst/>
+        </a:effectStyle>
+        <a:effectStyle>
+          <a:effectLst/>
+        </a:effectStyle>
+        <a:effectStyle>
+          <a:effectLst>
+            <a:outerShdw blurRad="57150" dist="19050" dir="5400000" algn="ctr" rotWithShape="0">
+              <a:srgbClr val="000000">
+                <a:alpha val="63000"/>
+              </a:srgbClr>
+            </a:outerShdw>
+          </a:effectLst>
+        </a:effectStyle>
+      </a:effectStyleLst>
+      <a:bgFillStyleLst>
+        <a:solidFill>
+          <a:schemeClr val="phClr"/>
+        </a:solidFill>
+        <a:solidFill>
+          <a:schemeClr val="phClr">
+            <a:tint val="95000"/>
+            <a:satMod val="170000"/>
+          </a:schemeClr>
+        </a:solidFill>
+        <a:gradFill rotWithShape="1">
+          <a:gsLst>
+            <a:gs pos="0">
+              <a:schemeClr val="phClr">
+                <a:tint val="93000"/>
+                <a:satMod val="150000"/>
+                <a:shade val="98000"/>
+                <a:lumMod val="102000"/>
+              </a:schemeClr>
+            </a:gs>
+            <a:gs pos="50000">
+              <a:schemeClr val="phClr">
+                <a:tint val="98000"/>
+                <a:satMod val="130000"/>
+                <a:shade val="90000"/>
+                <a:lumMod val="103000"/>
+              </a:schemeClr>
+            </a:gs>
+            <a:gs pos="100000">
+              <a:schemeClr val="phClr">
+                <a:shade val="63000"/>
+                <a:satMod val="120000"/>
+              </a:schemeClr>
+            </a:gs>
+          </a:gsLst>
+          <a:lin ang="5400000" scaled="0"/>
+        </a:gradFill>
+      </a:bgFillStyleLst>
+    </a:fmtScheme>
+  </a:themeElements>
+  <a:objectDefaults/>
+  <a:extraClrSchemeLst/>
+  <a:extLst>
+    <a:ext uri="{05A4C25C-085E-4340-85A3-A5531E510DB2}">
+      <thm15:themeFamily xmlns:thm15="http://schemas.microsoft.com/office/thememl/2012/main" name="Office Theme" id="{62F939B6-93AF-4DB8-9C6B-D6C7DFDC589F}" vid="{4A3C46E8-61CC-4603-A589-7422A47A8E4A}"/>
+    </a:ext>
+  </a:extLst>
+</a:theme>
 </file>
</xml_diff>